<commit_message>
Version 1.3.0 | Update HZX ppt part
</commit_message>
<xml_diff>
--- a/presentation/mid-term/ppt/HZX_模型优化及分工计划.pptx
+++ b/presentation/mid-term/ppt/HZX_模型优化及分工计划.pptx
@@ -5,11 +5,8 @@
     <p:sldMasterId id="2147483648" r:id="rId1"/>
   </p:sldMasterIdLst>
   <p:sldIdLst>
-    <p:sldId id="256" r:id="rId3"/>
-    <p:sldId id="259" r:id="rId4"/>
-    <p:sldId id="263" r:id="rId5"/>
-    <p:sldId id="267" r:id="rId6"/>
-    <p:sldId id="266" r:id="rId7"/>
+    <p:sldId id="256" r:id="rId2"/>
+    <p:sldId id="257" r:id="rId3"/>
   </p:sldIdLst>
   <p:sldSz cx="12192000" cy="6858000"/>
   <p:notesSz cx="6858000" cy="9144000"/>
@@ -108,6 +105,11 @@
       </a:defRPr>
     </a:lvl9pPr>
   </p:defaultTextStyle>
+  <p:extLst>
+    <p:ext uri="{EFAFB233-063F-42B5-8137-9DF3F51BA10A}">
+      <p15:sldGuideLst xmlns:p15="http://schemas.microsoft.com/office/powerpoint/2012/main"/>
+    </p:ext>
+  </p:extLst>
 </p:presentation>
 </file>
 
@@ -156,7 +158,6 @@
               <a:rPr lang="zh-CN" altLang="en-US"/>
               <a:t>单击此处编辑母版标题样式</a:t>
             </a:r>
-            <a:endParaRPr lang="zh-CN" altLang="en-US"/>
           </a:p>
         </p:txBody>
       </p:sp>
@@ -221,7 +222,6 @@
               <a:rPr lang="zh-CN" altLang="en-US"/>
               <a:t>单击此处编辑母版副标题样式</a:t>
             </a:r>
-            <a:endParaRPr lang="zh-CN" altLang="en-US"/>
           </a:p>
         </p:txBody>
       </p:sp>
@@ -242,6 +242,7 @@
           <a:p>
             <a:fld id="{D997B5FA-0921-464F-AAE1-844C04324D75}" type="datetimeFigureOut">
               <a:rPr lang="zh-CN" altLang="en-US" smtClean="0"/>
+              <a:t>2020/11/7</a:t>
             </a:fld>
             <a:endParaRPr lang="zh-CN" altLang="en-US"/>
           </a:p>
@@ -283,6 +284,7 @@
           <a:p>
             <a:fld id="{565CE74E-AB26-4998-AD42-012C4C1AD076}" type="slidenum">
               <a:rPr lang="zh-CN" altLang="en-US" smtClean="0"/>
+              <a:t>‹#›</a:t>
             </a:fld>
             <a:endParaRPr lang="zh-CN" altLang="en-US"/>
           </a:p>
@@ -332,7 +334,6 @@
               <a:rPr lang="zh-CN" altLang="en-US"/>
               <a:t>单击此处编辑母版标题样式</a:t>
             </a:r>
-            <a:endParaRPr lang="zh-CN" altLang="en-US"/>
           </a:p>
         </p:txBody>
       </p:sp>
@@ -356,7 +357,6 @@
               <a:rPr lang="zh-CN" altLang="en-US"/>
               <a:t>单击此处编辑母版文本样式</a:t>
             </a:r>
-            <a:endParaRPr lang="zh-CN" altLang="en-US"/>
           </a:p>
           <a:p>
             <a:pPr lvl="1"/>
@@ -364,7 +364,6 @@
               <a:rPr lang="zh-CN" altLang="en-US"/>
               <a:t>第二级</a:t>
             </a:r>
-            <a:endParaRPr lang="zh-CN" altLang="en-US"/>
           </a:p>
           <a:p>
             <a:pPr lvl="2"/>
@@ -372,7 +371,6 @@
               <a:rPr lang="zh-CN" altLang="en-US"/>
               <a:t>第三级</a:t>
             </a:r>
-            <a:endParaRPr lang="zh-CN" altLang="en-US"/>
           </a:p>
           <a:p>
             <a:pPr lvl="3"/>
@@ -380,7 +378,6 @@
               <a:rPr lang="zh-CN" altLang="en-US"/>
               <a:t>第四级</a:t>
             </a:r>
-            <a:endParaRPr lang="zh-CN" altLang="en-US"/>
           </a:p>
           <a:p>
             <a:pPr lvl="4"/>
@@ -388,7 +385,6 @@
               <a:rPr lang="zh-CN" altLang="en-US"/>
               <a:t>第五级</a:t>
             </a:r>
-            <a:endParaRPr lang="zh-CN" altLang="en-US"/>
           </a:p>
         </p:txBody>
       </p:sp>
@@ -409,6 +405,7 @@
           <a:p>
             <a:fld id="{D997B5FA-0921-464F-AAE1-844C04324D75}" type="datetimeFigureOut">
               <a:rPr lang="zh-CN" altLang="en-US" smtClean="0"/>
+              <a:t>2020/11/7</a:t>
             </a:fld>
             <a:endParaRPr lang="zh-CN" altLang="en-US"/>
           </a:p>
@@ -450,6 +447,7 @@
           <a:p>
             <a:fld id="{565CE74E-AB26-4998-AD42-012C4C1AD076}" type="slidenum">
               <a:rPr lang="zh-CN" altLang="en-US" smtClean="0"/>
+              <a:t>‹#›</a:t>
             </a:fld>
             <a:endParaRPr lang="zh-CN" altLang="en-US"/>
           </a:p>
@@ -504,7 +502,6 @@
               <a:rPr lang="zh-CN" altLang="en-US"/>
               <a:t>单击此处编辑母版标题样式</a:t>
             </a:r>
-            <a:endParaRPr lang="zh-CN" altLang="en-US"/>
           </a:p>
         </p:txBody>
       </p:sp>
@@ -533,7 +530,6 @@
               <a:rPr lang="zh-CN" altLang="en-US"/>
               <a:t>单击此处编辑母版文本样式</a:t>
             </a:r>
-            <a:endParaRPr lang="zh-CN" altLang="en-US"/>
           </a:p>
           <a:p>
             <a:pPr lvl="1"/>
@@ -541,7 +537,6 @@
               <a:rPr lang="zh-CN" altLang="en-US"/>
               <a:t>第二级</a:t>
             </a:r>
-            <a:endParaRPr lang="zh-CN" altLang="en-US"/>
           </a:p>
           <a:p>
             <a:pPr lvl="2"/>
@@ -549,7 +544,6 @@
               <a:rPr lang="zh-CN" altLang="en-US"/>
               <a:t>第三级</a:t>
             </a:r>
-            <a:endParaRPr lang="zh-CN" altLang="en-US"/>
           </a:p>
           <a:p>
             <a:pPr lvl="3"/>
@@ -557,7 +551,6 @@
               <a:rPr lang="zh-CN" altLang="en-US"/>
               <a:t>第四级</a:t>
             </a:r>
-            <a:endParaRPr lang="zh-CN" altLang="en-US"/>
           </a:p>
           <a:p>
             <a:pPr lvl="4"/>
@@ -565,7 +558,6 @@
               <a:rPr lang="zh-CN" altLang="en-US"/>
               <a:t>第五级</a:t>
             </a:r>
-            <a:endParaRPr lang="zh-CN" altLang="en-US"/>
           </a:p>
         </p:txBody>
       </p:sp>
@@ -586,6 +578,7 @@
           <a:p>
             <a:fld id="{D997B5FA-0921-464F-AAE1-844C04324D75}" type="datetimeFigureOut">
               <a:rPr lang="zh-CN" altLang="en-US" smtClean="0"/>
+              <a:t>2020/11/7</a:t>
             </a:fld>
             <a:endParaRPr lang="zh-CN" altLang="en-US"/>
           </a:p>
@@ -627,6 +620,7 @@
           <a:p>
             <a:fld id="{565CE74E-AB26-4998-AD42-012C4C1AD076}" type="slidenum">
               <a:rPr lang="zh-CN" altLang="en-US" smtClean="0"/>
+              <a:t>‹#›</a:t>
             </a:fld>
             <a:endParaRPr lang="zh-CN" altLang="en-US"/>
           </a:p>
@@ -676,7 +670,6 @@
               <a:rPr lang="zh-CN" altLang="en-US"/>
               <a:t>单击此处编辑母版标题样式</a:t>
             </a:r>
-            <a:endParaRPr lang="zh-CN" altLang="en-US"/>
           </a:p>
         </p:txBody>
       </p:sp>
@@ -700,7 +693,6 @@
               <a:rPr lang="zh-CN" altLang="en-US"/>
               <a:t>单击此处编辑母版文本样式</a:t>
             </a:r>
-            <a:endParaRPr lang="zh-CN" altLang="en-US"/>
           </a:p>
           <a:p>
             <a:pPr lvl="1"/>
@@ -708,7 +700,6 @@
               <a:rPr lang="zh-CN" altLang="en-US"/>
               <a:t>第二级</a:t>
             </a:r>
-            <a:endParaRPr lang="zh-CN" altLang="en-US"/>
           </a:p>
           <a:p>
             <a:pPr lvl="2"/>
@@ -716,7 +707,6 @@
               <a:rPr lang="zh-CN" altLang="en-US"/>
               <a:t>第三级</a:t>
             </a:r>
-            <a:endParaRPr lang="zh-CN" altLang="en-US"/>
           </a:p>
           <a:p>
             <a:pPr lvl="3"/>
@@ -724,7 +714,6 @@
               <a:rPr lang="zh-CN" altLang="en-US"/>
               <a:t>第四级</a:t>
             </a:r>
-            <a:endParaRPr lang="zh-CN" altLang="en-US"/>
           </a:p>
           <a:p>
             <a:pPr lvl="4"/>
@@ -732,7 +721,6 @@
               <a:rPr lang="zh-CN" altLang="en-US"/>
               <a:t>第五级</a:t>
             </a:r>
-            <a:endParaRPr lang="zh-CN" altLang="en-US"/>
           </a:p>
         </p:txBody>
       </p:sp>
@@ -753,6 +741,7 @@
           <a:p>
             <a:fld id="{D997B5FA-0921-464F-AAE1-844C04324D75}" type="datetimeFigureOut">
               <a:rPr lang="zh-CN" altLang="en-US" smtClean="0"/>
+              <a:t>2020/11/7</a:t>
             </a:fld>
             <a:endParaRPr lang="zh-CN" altLang="en-US"/>
           </a:p>
@@ -794,6 +783,7 @@
           <a:p>
             <a:fld id="{565CE74E-AB26-4998-AD42-012C4C1AD076}" type="slidenum">
               <a:rPr lang="zh-CN" altLang="en-US" smtClean="0"/>
+              <a:t>‹#›</a:t>
             </a:fld>
             <a:endParaRPr lang="zh-CN" altLang="en-US"/>
           </a:p>
@@ -852,7 +842,6 @@
               <a:rPr lang="zh-CN" altLang="en-US"/>
               <a:t>单击此处编辑母版标题样式</a:t>
             </a:r>
-            <a:endParaRPr lang="zh-CN" altLang="en-US"/>
           </a:p>
         </p:txBody>
       </p:sp>
@@ -972,7 +961,6 @@
               <a:rPr lang="zh-CN" altLang="en-US"/>
               <a:t>单击此处编辑母版文本样式</a:t>
             </a:r>
-            <a:endParaRPr lang="zh-CN" altLang="en-US"/>
           </a:p>
         </p:txBody>
       </p:sp>
@@ -993,6 +981,7 @@
           <a:p>
             <a:fld id="{D997B5FA-0921-464F-AAE1-844C04324D75}" type="datetimeFigureOut">
               <a:rPr lang="zh-CN" altLang="en-US" smtClean="0"/>
+              <a:t>2020/11/7</a:t>
             </a:fld>
             <a:endParaRPr lang="zh-CN" altLang="en-US"/>
           </a:p>
@@ -1034,6 +1023,7 @@
           <a:p>
             <a:fld id="{565CE74E-AB26-4998-AD42-012C4C1AD076}" type="slidenum">
               <a:rPr lang="zh-CN" altLang="en-US" smtClean="0"/>
+              <a:t>‹#›</a:t>
             </a:fld>
             <a:endParaRPr lang="zh-CN" altLang="en-US"/>
           </a:p>
@@ -1083,7 +1073,6 @@
               <a:rPr lang="zh-CN" altLang="en-US"/>
               <a:t>单击此处编辑母版标题样式</a:t>
             </a:r>
-            <a:endParaRPr lang="zh-CN" altLang="en-US"/>
           </a:p>
         </p:txBody>
       </p:sp>
@@ -1112,7 +1101,6 @@
               <a:rPr lang="zh-CN" altLang="en-US"/>
               <a:t>单击此处编辑母版文本样式</a:t>
             </a:r>
-            <a:endParaRPr lang="zh-CN" altLang="en-US"/>
           </a:p>
           <a:p>
             <a:pPr lvl="1"/>
@@ -1120,7 +1108,6 @@
               <a:rPr lang="zh-CN" altLang="en-US"/>
               <a:t>第二级</a:t>
             </a:r>
-            <a:endParaRPr lang="zh-CN" altLang="en-US"/>
           </a:p>
           <a:p>
             <a:pPr lvl="2"/>
@@ -1128,7 +1115,6 @@
               <a:rPr lang="zh-CN" altLang="en-US"/>
               <a:t>第三级</a:t>
             </a:r>
-            <a:endParaRPr lang="zh-CN" altLang="en-US"/>
           </a:p>
           <a:p>
             <a:pPr lvl="3"/>
@@ -1136,7 +1122,6 @@
               <a:rPr lang="zh-CN" altLang="en-US"/>
               <a:t>第四级</a:t>
             </a:r>
-            <a:endParaRPr lang="zh-CN" altLang="en-US"/>
           </a:p>
           <a:p>
             <a:pPr lvl="4"/>
@@ -1144,7 +1129,6 @@
               <a:rPr lang="zh-CN" altLang="en-US"/>
               <a:t>第五级</a:t>
             </a:r>
-            <a:endParaRPr lang="zh-CN" altLang="en-US"/>
           </a:p>
         </p:txBody>
       </p:sp>
@@ -1173,7 +1157,6 @@
               <a:rPr lang="zh-CN" altLang="en-US"/>
               <a:t>单击此处编辑母版文本样式</a:t>
             </a:r>
-            <a:endParaRPr lang="zh-CN" altLang="en-US"/>
           </a:p>
           <a:p>
             <a:pPr lvl="1"/>
@@ -1181,7 +1164,6 @@
               <a:rPr lang="zh-CN" altLang="en-US"/>
               <a:t>第二级</a:t>
             </a:r>
-            <a:endParaRPr lang="zh-CN" altLang="en-US"/>
           </a:p>
           <a:p>
             <a:pPr lvl="2"/>
@@ -1189,7 +1171,6 @@
               <a:rPr lang="zh-CN" altLang="en-US"/>
               <a:t>第三级</a:t>
             </a:r>
-            <a:endParaRPr lang="zh-CN" altLang="en-US"/>
           </a:p>
           <a:p>
             <a:pPr lvl="3"/>
@@ -1197,7 +1178,6 @@
               <a:rPr lang="zh-CN" altLang="en-US"/>
               <a:t>第四级</a:t>
             </a:r>
-            <a:endParaRPr lang="zh-CN" altLang="en-US"/>
           </a:p>
           <a:p>
             <a:pPr lvl="4"/>
@@ -1205,7 +1185,6 @@
               <a:rPr lang="zh-CN" altLang="en-US"/>
               <a:t>第五级</a:t>
             </a:r>
-            <a:endParaRPr lang="zh-CN" altLang="en-US"/>
           </a:p>
         </p:txBody>
       </p:sp>
@@ -1226,6 +1205,7 @@
           <a:p>
             <a:fld id="{D997B5FA-0921-464F-AAE1-844C04324D75}" type="datetimeFigureOut">
               <a:rPr lang="zh-CN" altLang="en-US" smtClean="0"/>
+              <a:t>2020/11/7</a:t>
             </a:fld>
             <a:endParaRPr lang="zh-CN" altLang="en-US"/>
           </a:p>
@@ -1267,6 +1247,7 @@
           <a:p>
             <a:fld id="{565CE74E-AB26-4998-AD42-012C4C1AD076}" type="slidenum">
               <a:rPr lang="zh-CN" altLang="en-US" smtClean="0"/>
+              <a:t>‹#›</a:t>
             </a:fld>
             <a:endParaRPr lang="zh-CN" altLang="en-US"/>
           </a:p>
@@ -1321,7 +1302,6 @@
               <a:rPr lang="zh-CN" altLang="en-US"/>
               <a:t>单击此处编辑母版标题样式</a:t>
             </a:r>
-            <a:endParaRPr lang="zh-CN" altLang="en-US"/>
           </a:p>
         </p:txBody>
       </p:sp>
@@ -1387,7 +1367,6 @@
               <a:rPr lang="zh-CN" altLang="en-US"/>
               <a:t>单击此处编辑母版文本样式</a:t>
             </a:r>
-            <a:endParaRPr lang="zh-CN" altLang="en-US"/>
           </a:p>
         </p:txBody>
       </p:sp>
@@ -1416,7 +1395,6 @@
               <a:rPr lang="zh-CN" altLang="en-US"/>
               <a:t>单击此处编辑母版文本样式</a:t>
             </a:r>
-            <a:endParaRPr lang="zh-CN" altLang="en-US"/>
           </a:p>
           <a:p>
             <a:pPr lvl="1"/>
@@ -1424,7 +1402,6 @@
               <a:rPr lang="zh-CN" altLang="en-US"/>
               <a:t>第二级</a:t>
             </a:r>
-            <a:endParaRPr lang="zh-CN" altLang="en-US"/>
           </a:p>
           <a:p>
             <a:pPr lvl="2"/>
@@ -1432,7 +1409,6 @@
               <a:rPr lang="zh-CN" altLang="en-US"/>
               <a:t>第三级</a:t>
             </a:r>
-            <a:endParaRPr lang="zh-CN" altLang="en-US"/>
           </a:p>
           <a:p>
             <a:pPr lvl="3"/>
@@ -1440,7 +1416,6 @@
               <a:rPr lang="zh-CN" altLang="en-US"/>
               <a:t>第四级</a:t>
             </a:r>
-            <a:endParaRPr lang="zh-CN" altLang="en-US"/>
           </a:p>
           <a:p>
             <a:pPr lvl="4"/>
@@ -1448,7 +1423,6 @@
               <a:rPr lang="zh-CN" altLang="en-US"/>
               <a:t>第五级</a:t>
             </a:r>
-            <a:endParaRPr lang="zh-CN" altLang="en-US"/>
           </a:p>
         </p:txBody>
       </p:sp>
@@ -1514,7 +1488,6 @@
               <a:rPr lang="zh-CN" altLang="en-US"/>
               <a:t>单击此处编辑母版文本样式</a:t>
             </a:r>
-            <a:endParaRPr lang="zh-CN" altLang="en-US"/>
           </a:p>
         </p:txBody>
       </p:sp>
@@ -1543,7 +1516,6 @@
               <a:rPr lang="zh-CN" altLang="en-US"/>
               <a:t>单击此处编辑母版文本样式</a:t>
             </a:r>
-            <a:endParaRPr lang="zh-CN" altLang="en-US"/>
           </a:p>
           <a:p>
             <a:pPr lvl="1"/>
@@ -1551,7 +1523,6 @@
               <a:rPr lang="zh-CN" altLang="en-US"/>
               <a:t>第二级</a:t>
             </a:r>
-            <a:endParaRPr lang="zh-CN" altLang="en-US"/>
           </a:p>
           <a:p>
             <a:pPr lvl="2"/>
@@ -1559,7 +1530,6 @@
               <a:rPr lang="zh-CN" altLang="en-US"/>
               <a:t>第三级</a:t>
             </a:r>
-            <a:endParaRPr lang="zh-CN" altLang="en-US"/>
           </a:p>
           <a:p>
             <a:pPr lvl="3"/>
@@ -1567,7 +1537,6 @@
               <a:rPr lang="zh-CN" altLang="en-US"/>
               <a:t>第四级</a:t>
             </a:r>
-            <a:endParaRPr lang="zh-CN" altLang="en-US"/>
           </a:p>
           <a:p>
             <a:pPr lvl="4"/>
@@ -1575,7 +1544,6 @@
               <a:rPr lang="zh-CN" altLang="en-US"/>
               <a:t>第五级</a:t>
             </a:r>
-            <a:endParaRPr lang="zh-CN" altLang="en-US"/>
           </a:p>
         </p:txBody>
       </p:sp>
@@ -1596,6 +1564,7 @@
           <a:p>
             <a:fld id="{D997B5FA-0921-464F-AAE1-844C04324D75}" type="datetimeFigureOut">
               <a:rPr lang="zh-CN" altLang="en-US" smtClean="0"/>
+              <a:t>2020/11/7</a:t>
             </a:fld>
             <a:endParaRPr lang="zh-CN" altLang="en-US"/>
           </a:p>
@@ -1637,6 +1606,7 @@
           <a:p>
             <a:fld id="{565CE74E-AB26-4998-AD42-012C4C1AD076}" type="slidenum">
               <a:rPr lang="zh-CN" altLang="en-US" smtClean="0"/>
+              <a:t>‹#›</a:t>
             </a:fld>
             <a:endParaRPr lang="zh-CN" altLang="en-US"/>
           </a:p>
@@ -1686,7 +1656,6 @@
               <a:rPr lang="zh-CN" altLang="en-US"/>
               <a:t>单击此处编辑母版标题样式</a:t>
             </a:r>
-            <a:endParaRPr lang="zh-CN" altLang="en-US"/>
           </a:p>
         </p:txBody>
       </p:sp>
@@ -1707,6 +1676,7 @@
           <a:p>
             <a:fld id="{D997B5FA-0921-464F-AAE1-844C04324D75}" type="datetimeFigureOut">
               <a:rPr lang="zh-CN" altLang="en-US" smtClean="0"/>
+              <a:t>2020/11/7</a:t>
             </a:fld>
             <a:endParaRPr lang="zh-CN" altLang="en-US"/>
           </a:p>
@@ -1748,6 +1718,7 @@
           <a:p>
             <a:fld id="{565CE74E-AB26-4998-AD42-012C4C1AD076}" type="slidenum">
               <a:rPr lang="zh-CN" altLang="en-US" smtClean="0"/>
+              <a:t>‹#›</a:t>
             </a:fld>
             <a:endParaRPr lang="zh-CN" altLang="en-US"/>
           </a:p>
@@ -1795,6 +1766,7 @@
           <a:p>
             <a:fld id="{D997B5FA-0921-464F-AAE1-844C04324D75}" type="datetimeFigureOut">
               <a:rPr lang="zh-CN" altLang="en-US" smtClean="0"/>
+              <a:t>2020/11/7</a:t>
             </a:fld>
             <a:endParaRPr lang="zh-CN" altLang="en-US"/>
           </a:p>
@@ -1836,6 +1808,7 @@
           <a:p>
             <a:fld id="{565CE74E-AB26-4998-AD42-012C4C1AD076}" type="slidenum">
               <a:rPr lang="zh-CN" altLang="en-US" smtClean="0"/>
+              <a:t>‹#›</a:t>
             </a:fld>
             <a:endParaRPr lang="zh-CN" altLang="en-US"/>
           </a:p>
@@ -1894,7 +1867,6 @@
               <a:rPr lang="zh-CN" altLang="en-US"/>
               <a:t>单击此处编辑母版标题样式</a:t>
             </a:r>
-            <a:endParaRPr lang="zh-CN" altLang="en-US"/>
           </a:p>
         </p:txBody>
       </p:sp>
@@ -1951,7 +1923,6 @@
               <a:rPr lang="zh-CN" altLang="en-US"/>
               <a:t>单击此处编辑母版文本样式</a:t>
             </a:r>
-            <a:endParaRPr lang="zh-CN" altLang="en-US"/>
           </a:p>
           <a:p>
             <a:pPr lvl="1"/>
@@ -1959,7 +1930,6 @@
               <a:rPr lang="zh-CN" altLang="en-US"/>
               <a:t>第二级</a:t>
             </a:r>
-            <a:endParaRPr lang="zh-CN" altLang="en-US"/>
           </a:p>
           <a:p>
             <a:pPr lvl="2"/>
@@ -1967,7 +1937,6 @@
               <a:rPr lang="zh-CN" altLang="en-US"/>
               <a:t>第三级</a:t>
             </a:r>
-            <a:endParaRPr lang="zh-CN" altLang="en-US"/>
           </a:p>
           <a:p>
             <a:pPr lvl="3"/>
@@ -1975,7 +1944,6 @@
               <a:rPr lang="zh-CN" altLang="en-US"/>
               <a:t>第四级</a:t>
             </a:r>
-            <a:endParaRPr lang="zh-CN" altLang="en-US"/>
           </a:p>
           <a:p>
             <a:pPr lvl="4"/>
@@ -1983,7 +1951,6 @@
               <a:rPr lang="zh-CN" altLang="en-US"/>
               <a:t>第五级</a:t>
             </a:r>
-            <a:endParaRPr lang="zh-CN" altLang="en-US"/>
           </a:p>
         </p:txBody>
       </p:sp>
@@ -2049,7 +2016,6 @@
               <a:rPr lang="zh-CN" altLang="en-US"/>
               <a:t>单击此处编辑母版文本样式</a:t>
             </a:r>
-            <a:endParaRPr lang="zh-CN" altLang="en-US"/>
           </a:p>
         </p:txBody>
       </p:sp>
@@ -2070,6 +2036,7 @@
           <a:p>
             <a:fld id="{D997B5FA-0921-464F-AAE1-844C04324D75}" type="datetimeFigureOut">
               <a:rPr lang="zh-CN" altLang="en-US" smtClean="0"/>
+              <a:t>2020/11/7</a:t>
             </a:fld>
             <a:endParaRPr lang="zh-CN" altLang="en-US"/>
           </a:p>
@@ -2111,6 +2078,7 @@
           <a:p>
             <a:fld id="{565CE74E-AB26-4998-AD42-012C4C1AD076}" type="slidenum">
               <a:rPr lang="zh-CN" altLang="en-US" smtClean="0"/>
+              <a:t>‹#›</a:t>
             </a:fld>
             <a:endParaRPr lang="zh-CN" altLang="en-US"/>
           </a:p>
@@ -2169,7 +2137,6 @@
               <a:rPr lang="zh-CN" altLang="en-US"/>
               <a:t>单击此处编辑母版标题样式</a:t>
             </a:r>
-            <a:endParaRPr lang="zh-CN" altLang="en-US"/>
           </a:p>
         </p:txBody>
       </p:sp>
@@ -2296,7 +2263,6 @@
               <a:rPr lang="zh-CN" altLang="en-US"/>
               <a:t>单击此处编辑母版文本样式</a:t>
             </a:r>
-            <a:endParaRPr lang="zh-CN" altLang="en-US"/>
           </a:p>
         </p:txBody>
       </p:sp>
@@ -2317,6 +2283,7 @@
           <a:p>
             <a:fld id="{D997B5FA-0921-464F-AAE1-844C04324D75}" type="datetimeFigureOut">
               <a:rPr lang="zh-CN" altLang="en-US" smtClean="0"/>
+              <a:t>2020/11/7</a:t>
             </a:fld>
             <a:endParaRPr lang="zh-CN" altLang="en-US"/>
           </a:p>
@@ -2358,6 +2325,7 @@
           <a:p>
             <a:fld id="{565CE74E-AB26-4998-AD42-012C4C1AD076}" type="slidenum">
               <a:rPr lang="zh-CN" altLang="en-US" smtClean="0"/>
+              <a:t>‹#›</a:t>
             </a:fld>
             <a:endParaRPr lang="zh-CN" altLang="en-US"/>
           </a:p>
@@ -2422,7 +2390,6 @@
               <a:rPr lang="zh-CN" altLang="en-US"/>
               <a:t>单击此处编辑母版标题样式</a:t>
             </a:r>
-            <a:endParaRPr lang="zh-CN" altLang="en-US"/>
           </a:p>
         </p:txBody>
       </p:sp>
@@ -2456,7 +2423,6 @@
               <a:rPr lang="zh-CN" altLang="en-US"/>
               <a:t>单击此处编辑母版文本样式</a:t>
             </a:r>
-            <a:endParaRPr lang="zh-CN" altLang="en-US"/>
           </a:p>
           <a:p>
             <a:pPr lvl="1"/>
@@ -2464,7 +2430,6 @@
               <a:rPr lang="zh-CN" altLang="en-US"/>
               <a:t>第二级</a:t>
             </a:r>
-            <a:endParaRPr lang="zh-CN" altLang="en-US"/>
           </a:p>
           <a:p>
             <a:pPr lvl="2"/>
@@ -2472,7 +2437,6 @@
               <a:rPr lang="zh-CN" altLang="en-US"/>
               <a:t>第三级</a:t>
             </a:r>
-            <a:endParaRPr lang="zh-CN" altLang="en-US"/>
           </a:p>
           <a:p>
             <a:pPr lvl="3"/>
@@ -2480,7 +2444,6 @@
               <a:rPr lang="zh-CN" altLang="en-US"/>
               <a:t>第四级</a:t>
             </a:r>
-            <a:endParaRPr lang="zh-CN" altLang="en-US"/>
           </a:p>
           <a:p>
             <a:pPr lvl="4"/>
@@ -2488,7 +2451,6 @@
               <a:rPr lang="zh-CN" altLang="en-US"/>
               <a:t>第五级</a:t>
             </a:r>
-            <a:endParaRPr lang="zh-CN" altLang="en-US"/>
           </a:p>
         </p:txBody>
       </p:sp>
@@ -2527,6 +2489,7 @@
           <a:p>
             <a:fld id="{D997B5FA-0921-464F-AAE1-844C04324D75}" type="datetimeFigureOut">
               <a:rPr lang="zh-CN" altLang="en-US" smtClean="0"/>
+              <a:t>2020/11/7</a:t>
             </a:fld>
             <a:endParaRPr lang="zh-CN" altLang="en-US"/>
           </a:p>
@@ -2604,6 +2567,7 @@
           <a:p>
             <a:fld id="{565CE74E-AB26-4998-AD42-012C4C1AD076}" type="slidenum">
               <a:rPr lang="zh-CN" altLang="en-US" smtClean="0"/>
+              <a:t>‹#›</a:t>
             </a:fld>
             <a:endParaRPr lang="zh-CN" altLang="en-US"/>
           </a:p>
@@ -2947,627 +2911,12 @@
           <a:p>
             <a:pPr algn="l"/>
             <a:r>
-              <a:rPr lang="zh-CN" altLang="en-US" sz="3600"/>
-              <a:t>模型架构介绍</a:t>
-            </a:r>
-            <a:endParaRPr lang="zh-CN" altLang="en-US" sz="3600"/>
-          </a:p>
-        </p:txBody>
-      </p:sp>
-      <p:grpSp>
-        <p:nvGrpSpPr>
-          <p:cNvPr id="7" name="组合 6"/>
-          <p:cNvGrpSpPr/>
-          <p:nvPr/>
-        </p:nvGrpSpPr>
-        <p:grpSpPr>
-          <a:xfrm>
-            <a:off x="1122045" y="4073525"/>
-            <a:ext cx="1693545" cy="1336675"/>
-            <a:chOff x="1157" y="3091"/>
-            <a:chExt cx="2801" cy="2260"/>
-          </a:xfrm>
-        </p:grpSpPr>
-        <p:sp>
-          <p:nvSpPr>
-            <p:cNvPr id="5" name="椭圆 4"/>
-            <p:cNvSpPr/>
-            <p:nvPr/>
-          </p:nvSpPr>
-          <p:spPr>
-            <a:xfrm>
-              <a:off x="1157" y="3091"/>
-              <a:ext cx="2801" cy="2260"/>
-            </a:xfrm>
-            <a:prstGeom prst="ellipse">
-              <a:avLst/>
-            </a:prstGeom>
-            <a:solidFill>
-              <a:schemeClr val="accent4">
-                <a:lumMod val="40000"/>
-                <a:lumOff val="60000"/>
-              </a:schemeClr>
-            </a:solidFill>
-            <a:ln>
-              <a:solidFill>
-                <a:schemeClr val="bg1"/>
-              </a:solidFill>
-            </a:ln>
-          </p:spPr>
-          <p:style>
-            <a:lnRef idx="2">
-              <a:schemeClr val="accent1">
-                <a:shade val="50000"/>
-              </a:schemeClr>
-            </a:lnRef>
-            <a:fillRef idx="1">
-              <a:schemeClr val="accent1"/>
-            </a:fillRef>
-            <a:effectRef idx="0">
-              <a:schemeClr val="accent1"/>
-            </a:effectRef>
-            <a:fontRef idx="minor">
-              <a:schemeClr val="lt1"/>
-            </a:fontRef>
-          </p:style>
-          <p:txBody>
-            <a:bodyPr rtlCol="0" anchor="ctr"/>
-            <a:lstStyle/>
-            <a:p>
-              <a:pPr algn="ctr"/>
-              <a:endParaRPr lang="zh-CN" altLang="en-US"/>
-            </a:p>
-          </p:txBody>
-        </p:sp>
-        <p:sp>
-          <p:nvSpPr>
-            <p:cNvPr id="6" name="文本框 5"/>
-            <p:cNvSpPr txBox="1"/>
-            <p:nvPr/>
-          </p:nvSpPr>
-          <p:spPr>
-            <a:xfrm>
-              <a:off x="1360" y="3676"/>
-              <a:ext cx="2395" cy="1091"/>
-            </a:xfrm>
-            <a:prstGeom prst="rect">
-              <a:avLst/>
-            </a:prstGeom>
-            <a:noFill/>
-          </p:spPr>
-          <p:txBody>
-            <a:bodyPr wrap="square" rtlCol="0" anchor="ctr" anchorCtr="0">
-              <a:spAutoFit/>
-            </a:bodyPr>
-            <a:lstStyle/>
-            <a:p>
-              <a:pPr algn="ctr"/>
-              <a:r>
-                <a:rPr lang="zh-CN" altLang="en-US"/>
-                <a:t>加载、处理好的数据</a:t>
-              </a:r>
-              <a:endParaRPr lang="zh-CN" altLang="en-US"/>
-            </a:p>
-          </p:txBody>
-        </p:sp>
-      </p:grpSp>
-      <p:grpSp>
-        <p:nvGrpSpPr>
-          <p:cNvPr id="16" name="组合 15"/>
-          <p:cNvGrpSpPr/>
-          <p:nvPr/>
-        </p:nvGrpSpPr>
-        <p:grpSpPr>
-          <a:xfrm>
-            <a:off x="3510280" y="4332605"/>
-            <a:ext cx="1249680" cy="819150"/>
-            <a:chOff x="6229" y="3499"/>
-            <a:chExt cx="1968" cy="1290"/>
-          </a:xfrm>
-        </p:grpSpPr>
-        <p:sp>
-          <p:nvSpPr>
-            <p:cNvPr id="14" name="圆角矩形 13"/>
-            <p:cNvSpPr/>
-            <p:nvPr/>
-          </p:nvSpPr>
-          <p:spPr>
-            <a:xfrm>
-              <a:off x="6229" y="3499"/>
-              <a:ext cx="1969" cy="1290"/>
-            </a:xfrm>
-            <a:prstGeom prst="roundRect">
-              <a:avLst/>
-            </a:prstGeom>
-            <a:solidFill>
-              <a:schemeClr val="accent1">
-                <a:lumMod val="40000"/>
-                <a:lumOff val="60000"/>
-              </a:schemeClr>
-            </a:solidFill>
-          </p:spPr>
-          <p:style>
-            <a:lnRef idx="2">
-              <a:schemeClr val="accent1">
-                <a:shade val="50000"/>
-              </a:schemeClr>
-            </a:lnRef>
-            <a:fillRef idx="1">
-              <a:schemeClr val="accent1"/>
-            </a:fillRef>
-            <a:effectRef idx="0">
-              <a:schemeClr val="accent1"/>
-            </a:effectRef>
-            <a:fontRef idx="minor">
-              <a:schemeClr val="lt1"/>
-            </a:fontRef>
-          </p:style>
-          <p:txBody>
-            <a:bodyPr rtlCol="0" anchor="ctr"/>
-            <a:lstStyle/>
-            <a:p>
-              <a:pPr algn="ctr"/>
-              <a:endParaRPr lang="zh-CN" altLang="en-US"/>
-            </a:p>
-          </p:txBody>
-        </p:sp>
-        <p:sp>
-          <p:nvSpPr>
-            <p:cNvPr id="15" name="文本框 14"/>
-            <p:cNvSpPr txBox="1"/>
-            <p:nvPr/>
-          </p:nvSpPr>
-          <p:spPr>
-            <a:xfrm>
-              <a:off x="6258" y="3853"/>
-              <a:ext cx="1912" cy="580"/>
-            </a:xfrm>
-            <a:prstGeom prst="rect">
-              <a:avLst/>
-            </a:prstGeom>
-            <a:noFill/>
-          </p:spPr>
-          <p:txBody>
-            <a:bodyPr wrap="square" rtlCol="0" anchor="ctr" anchorCtr="0">
-              <a:spAutoFit/>
-            </a:bodyPr>
-            <a:lstStyle/>
-            <a:p>
-              <a:pPr algn="ctr"/>
-              <a:r>
-                <a:rPr lang="en-US" altLang="zh-CN"/>
-                <a:t>BERT</a:t>
-              </a:r>
-              <a:endParaRPr lang="en-US" altLang="zh-CN"/>
-            </a:p>
-          </p:txBody>
-        </p:sp>
-      </p:grpSp>
-      <p:grpSp>
-        <p:nvGrpSpPr>
-          <p:cNvPr id="17" name="组合 16"/>
-          <p:cNvGrpSpPr/>
-          <p:nvPr/>
-        </p:nvGrpSpPr>
-        <p:grpSpPr>
-          <a:xfrm>
-            <a:off x="5470525" y="4332605"/>
-            <a:ext cx="1250315" cy="819150"/>
-            <a:chOff x="6229" y="3499"/>
-            <a:chExt cx="1969" cy="1290"/>
-          </a:xfrm>
-        </p:grpSpPr>
-        <p:sp>
-          <p:nvSpPr>
-            <p:cNvPr id="18" name="圆角矩形 17"/>
-            <p:cNvSpPr/>
-            <p:nvPr/>
-          </p:nvSpPr>
-          <p:spPr>
-            <a:xfrm>
-              <a:off x="6229" y="3499"/>
-              <a:ext cx="1969" cy="1290"/>
-            </a:xfrm>
-            <a:prstGeom prst="roundRect">
-              <a:avLst/>
-            </a:prstGeom>
-            <a:solidFill>
-              <a:schemeClr val="accent1">
-                <a:lumMod val="40000"/>
-                <a:lumOff val="60000"/>
-              </a:schemeClr>
-            </a:solidFill>
-          </p:spPr>
-          <p:style>
-            <a:lnRef idx="2">
-              <a:schemeClr val="accent1">
-                <a:shade val="50000"/>
-              </a:schemeClr>
-            </a:lnRef>
-            <a:fillRef idx="1">
-              <a:schemeClr val="accent1"/>
-            </a:fillRef>
-            <a:effectRef idx="0">
-              <a:schemeClr val="accent1"/>
-            </a:effectRef>
-            <a:fontRef idx="minor">
-              <a:schemeClr val="lt1"/>
-            </a:fontRef>
-          </p:style>
-          <p:txBody>
-            <a:bodyPr rtlCol="0" anchor="ctr"/>
-            <a:lstStyle/>
-            <a:p>
-              <a:pPr algn="ctr"/>
-              <a:endParaRPr lang="zh-CN" altLang="en-US"/>
-            </a:p>
-          </p:txBody>
-        </p:sp>
-        <p:sp>
-          <p:nvSpPr>
-            <p:cNvPr id="19" name="文本框 18"/>
-            <p:cNvSpPr txBox="1"/>
-            <p:nvPr/>
-          </p:nvSpPr>
-          <p:spPr>
-            <a:xfrm>
-              <a:off x="6258" y="3853"/>
-              <a:ext cx="1912" cy="580"/>
-            </a:xfrm>
-            <a:prstGeom prst="rect">
-              <a:avLst/>
-            </a:prstGeom>
-            <a:noFill/>
-          </p:spPr>
-          <p:txBody>
-            <a:bodyPr wrap="square" rtlCol="0" anchor="ctr" anchorCtr="0">
-              <a:spAutoFit/>
-            </a:bodyPr>
-            <a:lstStyle/>
-            <a:p>
-              <a:pPr algn="ctr"/>
-              <a:r>
-                <a:rPr lang="en-US" altLang="zh-CN"/>
-                <a:t>BiLSTM</a:t>
-              </a:r>
-              <a:endParaRPr lang="en-US" altLang="zh-CN"/>
-            </a:p>
-          </p:txBody>
-        </p:sp>
-      </p:grpSp>
-      <p:grpSp>
-        <p:nvGrpSpPr>
-          <p:cNvPr id="20" name="组合 19"/>
-          <p:cNvGrpSpPr/>
-          <p:nvPr/>
-        </p:nvGrpSpPr>
-        <p:grpSpPr>
-          <a:xfrm>
-            <a:off x="7443470" y="4332605"/>
-            <a:ext cx="1250315" cy="819150"/>
-            <a:chOff x="6229" y="3499"/>
-            <a:chExt cx="1969" cy="1290"/>
-          </a:xfrm>
-        </p:grpSpPr>
-        <p:sp>
-          <p:nvSpPr>
-            <p:cNvPr id="21" name="圆角矩形 20"/>
-            <p:cNvSpPr/>
-            <p:nvPr/>
-          </p:nvSpPr>
-          <p:spPr>
-            <a:xfrm>
-              <a:off x="6229" y="3499"/>
-              <a:ext cx="1969" cy="1290"/>
-            </a:xfrm>
-            <a:prstGeom prst="roundRect">
-              <a:avLst/>
-            </a:prstGeom>
-            <a:solidFill>
-              <a:schemeClr val="accent1">
-                <a:lumMod val="40000"/>
-                <a:lumOff val="60000"/>
-              </a:schemeClr>
-            </a:solidFill>
-          </p:spPr>
-          <p:style>
-            <a:lnRef idx="2">
-              <a:schemeClr val="accent1">
-                <a:shade val="50000"/>
-              </a:schemeClr>
-            </a:lnRef>
-            <a:fillRef idx="1">
-              <a:schemeClr val="accent1"/>
-            </a:fillRef>
-            <a:effectRef idx="0">
-              <a:schemeClr val="accent1"/>
-            </a:effectRef>
-            <a:fontRef idx="minor">
-              <a:schemeClr val="lt1"/>
-            </a:fontRef>
-          </p:style>
-          <p:txBody>
-            <a:bodyPr rtlCol="0" anchor="ctr"/>
-            <a:lstStyle/>
-            <a:p>
-              <a:pPr algn="ctr"/>
-              <a:endParaRPr lang="zh-CN" altLang="en-US"/>
-            </a:p>
-          </p:txBody>
-        </p:sp>
-        <p:sp>
-          <p:nvSpPr>
-            <p:cNvPr id="22" name="文本框 21"/>
-            <p:cNvSpPr txBox="1"/>
-            <p:nvPr/>
-          </p:nvSpPr>
-          <p:spPr>
-            <a:xfrm>
-              <a:off x="6258" y="3853"/>
-              <a:ext cx="1912" cy="580"/>
-            </a:xfrm>
-            <a:prstGeom prst="rect">
-              <a:avLst/>
-            </a:prstGeom>
-            <a:noFill/>
-          </p:spPr>
-          <p:txBody>
-            <a:bodyPr wrap="square" rtlCol="0" anchor="ctr" anchorCtr="0">
-              <a:spAutoFit/>
-            </a:bodyPr>
-            <a:lstStyle/>
-            <a:p>
-              <a:pPr algn="ctr"/>
-              <a:r>
-                <a:rPr lang="en-US" altLang="zh-CN"/>
-                <a:t>CRF</a:t>
-              </a:r>
-              <a:endParaRPr lang="en-US" altLang="zh-CN"/>
-            </a:p>
-          </p:txBody>
-        </p:sp>
-      </p:grpSp>
-      <p:cxnSp>
-        <p:nvCxnSpPr>
-          <p:cNvPr id="23" name="直接箭头连接符 22"/>
-          <p:cNvCxnSpPr/>
-          <p:nvPr/>
-        </p:nvCxnSpPr>
-        <p:spPr>
-          <a:xfrm flipV="1">
-            <a:off x="2815590" y="4741545"/>
-            <a:ext cx="713105" cy="635"/>
-          </a:xfrm>
-          <a:prstGeom prst="straightConnector1">
-            <a:avLst/>
-          </a:prstGeom>
-          <a:ln w="38100">
-            <a:solidFill>
-              <a:srgbClr val="FF0000"/>
-            </a:solidFill>
-            <a:tailEnd type="arrow"/>
-          </a:ln>
-        </p:spPr>
-        <p:style>
-          <a:lnRef idx="1">
-            <a:schemeClr val="accent1"/>
-          </a:lnRef>
-          <a:fillRef idx="0">
-            <a:schemeClr val="accent1"/>
-          </a:fillRef>
-          <a:effectRef idx="0">
-            <a:schemeClr val="accent1"/>
-          </a:effectRef>
-          <a:fontRef idx="minor">
-            <a:schemeClr val="tx1"/>
-          </a:fontRef>
-        </p:style>
-      </p:cxnSp>
-      <p:cxnSp>
-        <p:nvCxnSpPr>
-          <p:cNvPr id="24" name="直接箭头连接符 23"/>
-          <p:cNvCxnSpPr/>
-          <p:nvPr/>
-        </p:nvCxnSpPr>
-        <p:spPr>
-          <a:xfrm flipV="1">
-            <a:off x="8693785" y="4742815"/>
-            <a:ext cx="713105" cy="635"/>
-          </a:xfrm>
-          <a:prstGeom prst="straightConnector1">
-            <a:avLst/>
-          </a:prstGeom>
-          <a:ln w="38100">
-            <a:solidFill>
-              <a:srgbClr val="FF0000"/>
-            </a:solidFill>
-            <a:tailEnd type="arrow"/>
-          </a:ln>
-        </p:spPr>
-        <p:style>
-          <a:lnRef idx="1">
-            <a:schemeClr val="accent1"/>
-          </a:lnRef>
-          <a:fillRef idx="0">
-            <a:schemeClr val="accent1"/>
-          </a:fillRef>
-          <a:effectRef idx="0">
-            <a:schemeClr val="accent1"/>
-          </a:effectRef>
-          <a:fontRef idx="minor">
-            <a:schemeClr val="tx1"/>
-          </a:fontRef>
-        </p:style>
-      </p:cxnSp>
-      <p:cxnSp>
-        <p:nvCxnSpPr>
-          <p:cNvPr id="25" name="直接箭头连接符 24"/>
-          <p:cNvCxnSpPr/>
-          <p:nvPr/>
-        </p:nvCxnSpPr>
-        <p:spPr>
-          <a:xfrm flipV="1">
-            <a:off x="6720840" y="4742180"/>
-            <a:ext cx="713105" cy="635"/>
-          </a:xfrm>
-          <a:prstGeom prst="straightConnector1">
-            <a:avLst/>
-          </a:prstGeom>
-          <a:ln w="38100">
-            <a:solidFill>
-              <a:srgbClr val="FF0000"/>
-            </a:solidFill>
-            <a:tailEnd type="arrow"/>
-          </a:ln>
-        </p:spPr>
-        <p:style>
-          <a:lnRef idx="1">
-            <a:schemeClr val="accent1"/>
-          </a:lnRef>
-          <a:fillRef idx="0">
-            <a:schemeClr val="accent1"/>
-          </a:fillRef>
-          <a:effectRef idx="0">
-            <a:schemeClr val="accent1"/>
-          </a:effectRef>
-          <a:fontRef idx="minor">
-            <a:schemeClr val="tx1"/>
-          </a:fontRef>
-        </p:style>
-      </p:cxnSp>
-      <p:cxnSp>
-        <p:nvCxnSpPr>
-          <p:cNvPr id="26" name="直接箭头连接符 25"/>
-          <p:cNvCxnSpPr/>
-          <p:nvPr/>
-        </p:nvCxnSpPr>
-        <p:spPr>
-          <a:xfrm flipV="1">
-            <a:off x="4760595" y="4740910"/>
-            <a:ext cx="713105" cy="635"/>
-          </a:xfrm>
-          <a:prstGeom prst="straightConnector1">
-            <a:avLst/>
-          </a:prstGeom>
-          <a:ln w="38100">
-            <a:solidFill>
-              <a:srgbClr val="FF0000"/>
-            </a:solidFill>
-            <a:tailEnd type="arrow"/>
-          </a:ln>
-        </p:spPr>
-        <p:style>
-          <a:lnRef idx="1">
-            <a:schemeClr val="accent1"/>
-          </a:lnRef>
-          <a:fillRef idx="0">
-            <a:schemeClr val="accent1"/>
-          </a:fillRef>
-          <a:effectRef idx="0">
-            <a:schemeClr val="accent1"/>
-          </a:effectRef>
-          <a:fontRef idx="minor">
-            <a:schemeClr val="tx1"/>
-          </a:fontRef>
-        </p:style>
-      </p:cxnSp>
-      <p:grpSp>
-        <p:nvGrpSpPr>
-          <p:cNvPr id="27" name="组合 26"/>
-          <p:cNvGrpSpPr/>
-          <p:nvPr/>
-        </p:nvGrpSpPr>
-        <p:grpSpPr>
-          <a:xfrm>
-            <a:off x="9406890" y="4074795"/>
-            <a:ext cx="1693545" cy="1336675"/>
-            <a:chOff x="1157" y="3091"/>
-            <a:chExt cx="2801" cy="2260"/>
-          </a:xfrm>
-        </p:grpSpPr>
-        <p:sp>
-          <p:nvSpPr>
-            <p:cNvPr id="28" name="椭圆 27"/>
-            <p:cNvSpPr/>
-            <p:nvPr/>
-          </p:nvSpPr>
-          <p:spPr>
-            <a:xfrm>
-              <a:off x="1157" y="3091"/>
-              <a:ext cx="2801" cy="2260"/>
-            </a:xfrm>
-            <a:prstGeom prst="ellipse">
-              <a:avLst/>
-            </a:prstGeom>
-            <a:solidFill>
-              <a:schemeClr val="accent4">
-                <a:lumMod val="40000"/>
-                <a:lumOff val="60000"/>
-              </a:schemeClr>
-            </a:solidFill>
-            <a:ln>
-              <a:solidFill>
-                <a:schemeClr val="bg1"/>
-              </a:solidFill>
-            </a:ln>
-          </p:spPr>
-          <p:style>
-            <a:lnRef idx="2">
-              <a:schemeClr val="accent1">
-                <a:shade val="50000"/>
-              </a:schemeClr>
-            </a:lnRef>
-            <a:fillRef idx="1">
-              <a:schemeClr val="accent1"/>
-            </a:fillRef>
-            <a:effectRef idx="0">
-              <a:schemeClr val="accent1"/>
-            </a:effectRef>
-            <a:fontRef idx="minor">
-              <a:schemeClr val="lt1"/>
-            </a:fontRef>
-          </p:style>
-          <p:txBody>
-            <a:bodyPr rtlCol="0" anchor="ctr"/>
-            <a:lstStyle/>
-            <a:p>
-              <a:pPr algn="ctr"/>
-              <a:endParaRPr lang="zh-CN" altLang="en-US"/>
-            </a:p>
-          </p:txBody>
-        </p:sp>
-        <p:sp>
-          <p:nvSpPr>
-            <p:cNvPr id="29" name="文本框 28"/>
-            <p:cNvSpPr txBox="1"/>
-            <p:nvPr/>
-          </p:nvSpPr>
-          <p:spPr>
-            <a:xfrm>
-              <a:off x="1360" y="3910"/>
-              <a:ext cx="2395" cy="623"/>
-            </a:xfrm>
-            <a:prstGeom prst="rect">
-              <a:avLst/>
-            </a:prstGeom>
-            <a:noFill/>
-          </p:spPr>
-          <p:txBody>
-            <a:bodyPr wrap="square" rtlCol="0" anchor="ctr" anchorCtr="0">
-              <a:spAutoFit/>
-            </a:bodyPr>
-            <a:lstStyle/>
-            <a:p>
-              <a:pPr algn="ctr"/>
-              <a:r>
-                <a:rPr lang="zh-CN" altLang="en-US"/>
-                <a:t>预测的标签</a:t>
-              </a:r>
-              <a:endParaRPr lang="zh-CN" altLang="en-US"/>
-            </a:p>
-          </p:txBody>
-        </p:sp>
-      </p:grpSp>
+              <a:rPr lang="zh-CN" altLang="en-US" sz="3600" dirty="0"/>
+              <a:t>模型优化思路</a:t>
+            </a:r>
+          </a:p>
+        </p:txBody>
+      </p:sp>
       <p:sp>
         <p:nvSpPr>
           <p:cNvPr id="30" name="文本框 29"/>
@@ -3576,8 +2925,8 @@
         </p:nvSpPr>
         <p:spPr>
           <a:xfrm>
-            <a:off x="1122045" y="1487170"/>
-            <a:ext cx="7773380" cy="1631216"/>
+            <a:off x="1122045" y="1504925"/>
+            <a:ext cx="7773380" cy="1554272"/>
           </a:xfrm>
           <a:prstGeom prst="rect">
             <a:avLst/>
@@ -3598,18 +2947,22 @@
               <a:buChar char="l"/>
             </a:pPr>
             <a:r>
-              <a:rPr lang="en-US" altLang="zh-CN" dirty="0"/>
-              <a:t>BERT</a:t>
-            </a:r>
-            <a:r>
-              <a:rPr lang="zh-CN" altLang="en-US" dirty="0"/>
-              <a:t>：</a:t>
-            </a:r>
-            <a:r>
-              <a:rPr lang="zh-CN" dirty="0"/>
-              <a:t>基于对中文语料库的预学习，对训练集的数据进行预训练并微调，得到测试集的词嵌入特征。</a:t>
-            </a:r>
-            <a:endParaRPr lang="zh-CN" dirty="0"/>
+              <a:rPr lang="en-US" altLang="zh-CN" sz="2000" dirty="0"/>
+              <a:t>P</a:t>
+            </a:r>
+            <a:r>
+              <a:rPr lang="zh-CN" altLang="en-US" sz="2000" dirty="0"/>
+              <a:t>次</a:t>
+            </a:r>
+            <a:r>
+              <a:rPr lang="en-US" altLang="zh-CN" sz="2000" dirty="0"/>
+              <a:t>K</a:t>
+            </a:r>
+            <a:r>
+              <a:rPr lang="zh-CN" altLang="en-US" sz="2000" dirty="0"/>
+              <a:t>折交叉验证法评价训练过程</a:t>
+            </a:r>
+            <a:endParaRPr lang="en-US" altLang="zh-CN" sz="2000" dirty="0"/>
           </a:p>
           <a:p>
             <a:pPr marL="285750" indent="-285750" fontAlgn="auto">
@@ -3620,22 +2973,14 @@
               <a:buChar char="l"/>
             </a:pPr>
             <a:r>
-              <a:rPr lang="en-US" altLang="zh-CN" dirty="0" err="1"/>
-              <a:t>BiLSTM</a:t>
-            </a:r>
-            <a:r>
-              <a:rPr lang="zh-CN" altLang="en-US" dirty="0"/>
-              <a:t>：</a:t>
-            </a:r>
-            <a:r>
-              <a:rPr lang="zh-CN" altLang="en-US" dirty="0">
-                <a:sym typeface="+mn-ea"/>
-              </a:rPr>
-              <a:t>从词序列的开头与结尾分别向后与向前建立时序模型。</a:t>
-            </a:r>
-            <a:endParaRPr lang="zh-CN" altLang="en-US" dirty="0">
-              <a:sym typeface="+mn-ea"/>
-            </a:endParaRPr>
+              <a:rPr lang="en-US" altLang="zh-CN" sz="2000" dirty="0"/>
+              <a:t>Label</a:t>
+            </a:r>
+            <a:r>
+              <a:rPr lang="zh-CN" altLang="en-US" sz="2000" dirty="0"/>
+              <a:t>分布并非均匀分布，考虑损失函数针对分布进行调整</a:t>
+            </a:r>
+            <a:endParaRPr lang="en-US" altLang="zh-CN" sz="2000" dirty="0"/>
           </a:p>
           <a:p>
             <a:pPr marL="285750" indent="-285750" fontAlgn="auto">
@@ -3646,14 +2991,206 @@
               <a:buChar char="l"/>
             </a:pPr>
             <a:r>
-              <a:rPr lang="en-US" altLang="zh-CN" dirty="0" err="1"/>
-              <a:t>CRF</a:t>
-            </a:r>
-            <a:r>
-              <a:rPr lang="zh-CN" altLang="en-US" dirty="0"/>
-              <a:t>：在条件随机场中，计算由相邻节点所表示的联合概率，根据最佳结果完成预测。</a:t>
-            </a:r>
-            <a:endParaRPr lang="zh-CN" altLang="en-US" dirty="0"/>
+              <a:rPr lang="zh-CN" altLang="en-US" sz="2000" dirty="0"/>
+              <a:t>数据增强提高泛化性能</a:t>
+            </a:r>
+            <a:r>
+              <a:rPr lang="en-US" altLang="zh-CN" sz="2000" dirty="0"/>
+              <a:t>——</a:t>
+            </a:r>
+            <a:r>
+              <a:rPr lang="zh-CN" altLang="en-US" sz="2000" dirty="0"/>
+              <a:t>同</a:t>
+            </a:r>
+            <a:r>
+              <a:rPr lang="en-US" altLang="zh-CN" sz="2000" dirty="0"/>
+              <a:t>label</a:t>
+            </a:r>
+            <a:r>
+              <a:rPr lang="zh-CN" altLang="en-US" sz="2000" dirty="0"/>
+              <a:t>替换等操作</a:t>
+            </a:r>
+            <a:endParaRPr lang="en-US" altLang="zh-CN" sz="2000" dirty="0"/>
+          </a:p>
+          <a:p>
+            <a:pPr marL="285750" indent="-285750" fontAlgn="auto">
+              <a:spcAft>
+                <a:spcPts val="600"/>
+              </a:spcAft>
+              <a:buFont typeface="Wingdings" panose="05000000000000000000" charset="0"/>
+              <a:buChar char="l"/>
+            </a:pPr>
+            <a:r>
+              <a:rPr lang="zh-CN" altLang="en-US" sz="2000" dirty="0"/>
+              <a:t>考虑拓展数据集</a:t>
+            </a:r>
+          </a:p>
+        </p:txBody>
+      </p:sp>
+      <p:sp>
+        <p:nvSpPr>
+          <p:cNvPr id="3" name="文本框 2">
+            <a:extLst>
+              <a:ext uri="{FF2B5EF4-FFF2-40B4-BE49-F238E27FC236}">
+                <a16:creationId xmlns:a16="http://schemas.microsoft.com/office/drawing/2014/main" id="{36597C16-FF64-4212-AF1E-5A73AE96C99A}"/>
+              </a:ext>
+            </a:extLst>
+          </p:cNvPr>
+          <p:cNvSpPr txBox="1"/>
+          <p:nvPr/>
+        </p:nvSpPr>
+        <p:spPr>
+          <a:xfrm>
+            <a:off x="8025412" y="1851173"/>
+            <a:ext cx="3364638" cy="369332"/>
+          </a:xfrm>
+          <a:prstGeom prst="rect">
+            <a:avLst/>
+          </a:prstGeom>
+          <a:noFill/>
+        </p:spPr>
+        <p:txBody>
+          <a:bodyPr wrap="square" rtlCol="0">
+            <a:spAutoFit/>
+          </a:bodyPr>
+          <a:lstStyle/>
+          <a:p>
+            <a:r>
+              <a:rPr lang="zh-CN" altLang="en-US" dirty="0">
+                <a:solidFill>
+                  <a:srgbClr val="FF0000"/>
+                </a:solidFill>
+              </a:rPr>
+              <a:t>（</a:t>
+            </a:r>
+            <a:r>
+              <a:rPr lang="en-US" altLang="zh-CN" dirty="0">
+                <a:solidFill>
+                  <a:srgbClr val="FF0000"/>
+                </a:solidFill>
+              </a:rPr>
+              <a:t>Label</a:t>
+            </a:r>
+            <a:r>
+              <a:rPr lang="zh-CN" altLang="en-US" dirty="0">
+                <a:solidFill>
+                  <a:srgbClr val="FF0000"/>
+                </a:solidFill>
+              </a:rPr>
+              <a:t>分布插一个</a:t>
+            </a:r>
+            <a:r>
+              <a:rPr lang="en-US" altLang="zh-CN" dirty="0">
+                <a:solidFill>
+                  <a:srgbClr val="FF0000"/>
+                </a:solidFill>
+              </a:rPr>
+              <a:t>LMX</a:t>
+            </a:r>
+            <a:r>
+              <a:rPr lang="zh-CN" altLang="en-US" dirty="0">
+                <a:solidFill>
+                  <a:srgbClr val="FF0000"/>
+                </a:solidFill>
+              </a:rPr>
+              <a:t>的图）</a:t>
+            </a:r>
+          </a:p>
+        </p:txBody>
+      </p:sp>
+      <p:pic>
+        <p:nvPicPr>
+          <p:cNvPr id="8" name="图片 7">
+            <a:extLst>
+              <a:ext uri="{FF2B5EF4-FFF2-40B4-BE49-F238E27FC236}">
+                <a16:creationId xmlns:a16="http://schemas.microsoft.com/office/drawing/2014/main" id="{82D2128B-F69D-4FF6-9D98-BD5E034AD9C8}"/>
+              </a:ext>
+            </a:extLst>
+          </p:cNvPr>
+          <p:cNvPicPr>
+            <a:picLocks noChangeAspect="1"/>
+          </p:cNvPicPr>
+          <p:nvPr/>
+        </p:nvPicPr>
+        <p:blipFill>
+          <a:blip r:embed="rId2">
+            <a:extLst>
+              <a:ext uri="{28A0092B-C50C-407E-A947-70E740481C1C}">
+                <a14:useLocalDpi xmlns:a14="http://schemas.microsoft.com/office/drawing/2010/main" val="0"/>
+              </a:ext>
+            </a:extLst>
+          </a:blip>
+          <a:stretch>
+            <a:fillRect/>
+          </a:stretch>
+        </p:blipFill>
+        <p:spPr>
+          <a:xfrm>
+            <a:off x="1862044" y="3533035"/>
+            <a:ext cx="4325691" cy="2540740"/>
+          </a:xfrm>
+          <a:prstGeom prst="rect">
+            <a:avLst/>
+          </a:prstGeom>
+        </p:spPr>
+      </p:pic>
+      <p:sp>
+        <p:nvSpPr>
+          <p:cNvPr id="31" name="文本框 30">
+            <a:extLst>
+              <a:ext uri="{FF2B5EF4-FFF2-40B4-BE49-F238E27FC236}">
+                <a16:creationId xmlns:a16="http://schemas.microsoft.com/office/drawing/2014/main" id="{44BAEF3D-AD8E-4837-92BA-B84FEA782BEF}"/>
+              </a:ext>
+            </a:extLst>
+          </p:cNvPr>
+          <p:cNvSpPr txBox="1"/>
+          <p:nvPr/>
+        </p:nvSpPr>
+        <p:spPr>
+          <a:xfrm>
+            <a:off x="2496103" y="6178281"/>
+            <a:ext cx="2155796" cy="369332"/>
+          </a:xfrm>
+          <a:prstGeom prst="rect">
+            <a:avLst/>
+          </a:prstGeom>
+          <a:noFill/>
+        </p:spPr>
+        <p:txBody>
+          <a:bodyPr wrap="square" rtlCol="0">
+            <a:spAutoFit/>
+          </a:bodyPr>
+          <a:lstStyle/>
+          <a:p>
+            <a:r>
+              <a:rPr lang="en-US" altLang="zh-CN" dirty="0">
+                <a:solidFill>
+                  <a:srgbClr val="FF0000"/>
+                </a:solidFill>
+              </a:rPr>
+              <a:t>(K</a:t>
+            </a:r>
+            <a:r>
+              <a:rPr lang="zh-CN" altLang="en-US" dirty="0">
+                <a:solidFill>
+                  <a:srgbClr val="FF0000"/>
+                </a:solidFill>
+              </a:rPr>
+              <a:t>折交叉验证的图</a:t>
+            </a:r>
+            <a:r>
+              <a:rPr lang="en-US" altLang="zh-CN" dirty="0">
+                <a:solidFill>
+                  <a:srgbClr val="FF0000"/>
+                </a:solidFill>
+              </a:rPr>
+              <a:t>)</a:t>
+            </a:r>
+            <a:endParaRPr lang="zh-CN" altLang="en-US" dirty="0">
+              <a:solidFill>
+                <a:srgbClr val="FF0000"/>
+              </a:solidFill>
+            </a:endParaRPr>
           </a:p>
         </p:txBody>
       </p:sp>
@@ -3695,1199 +3232,63 @@
         <p:spPr>
           <a:xfrm>
             <a:off x="389255" y="387350"/>
-            <a:ext cx="10852150" cy="811530"/>
+            <a:ext cx="3719830" cy="811530"/>
           </a:xfrm>
         </p:spPr>
         <p:txBody>
-          <a:bodyPr anchor="ctr" anchorCtr="0">
-            <a:noAutofit/>
-          </a:bodyPr>
+          <a:bodyPr anchor="ctr" anchorCtr="0"/>
           <a:lstStyle/>
           <a:p>
             <a:pPr algn="l"/>
             <a:r>
-              <a:rPr lang="en-US" altLang="zh-CN" sz="3200">
-                <a:sym typeface="+mn-ea"/>
-              </a:rPr>
-              <a:t>BERT(Bidirectional Encoder Representations from Transformers)</a:t>
-            </a:r>
-            <a:endParaRPr lang="en-US" altLang="zh-CN" sz="3200">
-              <a:sym typeface="+mn-ea"/>
-            </a:endParaRPr>
-          </a:p>
-        </p:txBody>
-      </p:sp>
-      <p:sp>
-        <p:nvSpPr>
-          <p:cNvPr id="4" name="文本框 3"/>
-          <p:cNvSpPr txBox="1"/>
-          <p:nvPr/>
-        </p:nvSpPr>
-        <p:spPr>
-          <a:xfrm>
-            <a:off x="689610" y="1138555"/>
-            <a:ext cx="7125970" cy="1630045"/>
-          </a:xfrm>
-          <a:prstGeom prst="rect">
-            <a:avLst/>
-          </a:prstGeom>
-          <a:noFill/>
-        </p:spPr>
-        <p:txBody>
-          <a:bodyPr wrap="square" rtlCol="0">
-            <a:spAutoFit/>
-          </a:bodyPr>
-          <a:lstStyle/>
-          <a:p>
-            <a:pPr marL="285750" indent="-285750" fontAlgn="auto">
-              <a:spcAft>
-                <a:spcPts val="600"/>
-              </a:spcAft>
-              <a:buFont typeface="Wingdings" panose="05000000000000000000" charset="0"/>
-              <a:buChar char="l"/>
-            </a:pPr>
-            <a:r>
-              <a:rPr lang="zh-CN" altLang="en-US"/>
-              <a:t>使用</a:t>
-            </a:r>
-            <a:r>
-              <a:rPr lang="en-US" altLang="zh-CN"/>
-              <a:t>Transformer</a:t>
-            </a:r>
-            <a:r>
-              <a:rPr lang="zh-CN" altLang="en-US"/>
-              <a:t>作为算法的主要框架，利用</a:t>
-            </a:r>
-            <a:r>
-              <a:rPr lang="en-US" altLang="zh-CN"/>
-              <a:t>token</a:t>
-            </a:r>
-            <a:r>
-              <a:rPr lang="zh-CN" altLang="en-US"/>
-              <a:t>在语句中的上下文双向位置关系。</a:t>
-            </a:r>
-            <a:endParaRPr lang="zh-CN" altLang="en-US"/>
-          </a:p>
-          <a:p>
-            <a:pPr marL="285750" indent="-285750" fontAlgn="auto">
-              <a:spcAft>
-                <a:spcPts val="600"/>
-              </a:spcAft>
-              <a:buFont typeface="Wingdings" panose="05000000000000000000" charset="0"/>
-              <a:buChar char="l"/>
-            </a:pPr>
-            <a:r>
-              <a:rPr lang="zh-CN" altLang="en-US"/>
-              <a:t>使用</a:t>
-            </a:r>
-            <a:r>
-              <a:rPr lang="en-US" altLang="zh-CN"/>
-              <a:t>MLM(Mask Language Model)</a:t>
-            </a:r>
-            <a:r>
-              <a:rPr lang="zh-CN" altLang="en-US"/>
-              <a:t>和</a:t>
-            </a:r>
-            <a:r>
-              <a:rPr lang="en-US" altLang="zh-CN"/>
-              <a:t>NSP(Next Sentence Prediction)</a:t>
-            </a:r>
-            <a:r>
-              <a:rPr lang="zh-CN" altLang="en-US"/>
-              <a:t>的多任务训练目标。</a:t>
-            </a:r>
-            <a:endParaRPr lang="zh-CN" altLang="en-US"/>
-          </a:p>
-          <a:p>
-            <a:pPr marL="285750" indent="-285750" fontAlgn="auto">
-              <a:spcAft>
-                <a:spcPts val="600"/>
-              </a:spcAft>
-              <a:buFont typeface="Wingdings" panose="05000000000000000000" charset="0"/>
-              <a:buChar char="l"/>
-            </a:pPr>
-            <a:r>
-              <a:rPr lang="zh-CN" altLang="en-US"/>
-              <a:t>针对大规模的数据使用强大的机器训练，有很高的覆盖性。</a:t>
-            </a:r>
-            <a:endParaRPr lang="zh-CN" altLang="en-US"/>
+              <a:rPr lang="zh-CN" altLang="en-US" sz="3600" dirty="0"/>
+              <a:t>分工计划</a:t>
+            </a:r>
           </a:p>
         </p:txBody>
       </p:sp>
       <p:pic>
         <p:nvPicPr>
-          <p:cNvPr id="3" name="图片 1"/>
+          <p:cNvPr id="4" name="图片 3">
+            <a:extLst>
+              <a:ext uri="{FF2B5EF4-FFF2-40B4-BE49-F238E27FC236}">
+                <a16:creationId xmlns:a16="http://schemas.microsoft.com/office/drawing/2014/main" id="{85FB6C1A-44CC-4A50-862C-DC456D61069A}"/>
+              </a:ext>
+            </a:extLst>
+          </p:cNvPr>
           <p:cNvPicPr>
             <a:picLocks noChangeAspect="1"/>
           </p:cNvPicPr>
           <p:nvPr/>
         </p:nvPicPr>
         <p:blipFill>
-          <a:blip r:embed="rId1"/>
+          <a:blip r:embed="rId2">
+            <a:extLst>
+              <a:ext uri="{28A0092B-C50C-407E-A947-70E740481C1C}">
+                <a14:useLocalDpi xmlns:a14="http://schemas.microsoft.com/office/drawing/2010/main" val="0"/>
+              </a:ext>
+            </a:extLst>
+          </a:blip>
           <a:stretch>
             <a:fillRect/>
           </a:stretch>
         </p:blipFill>
         <p:spPr>
           <a:xfrm>
-            <a:off x="1018540" y="2768600"/>
-            <a:ext cx="3088005" cy="4081145"/>
-          </a:xfrm>
-          <a:prstGeom prst="rect">
-            <a:avLst/>
-          </a:prstGeom>
-          <a:noFill/>
-          <a:ln>
-            <a:noFill/>
-          </a:ln>
-        </p:spPr>
-      </p:pic>
-      <p:sp>
-        <p:nvSpPr>
-          <p:cNvPr id="5" name="文本框 4"/>
-          <p:cNvSpPr txBox="1"/>
-          <p:nvPr/>
-        </p:nvSpPr>
-        <p:spPr>
-          <a:xfrm>
-            <a:off x="4326890" y="3796665"/>
-            <a:ext cx="2834640" cy="2106930"/>
-          </a:xfrm>
-          <a:prstGeom prst="rect">
-            <a:avLst/>
-          </a:prstGeom>
-          <a:noFill/>
-        </p:spPr>
-        <p:txBody>
-          <a:bodyPr wrap="square" rtlCol="0">
-            <a:spAutoFit/>
-          </a:bodyPr>
-          <a:lstStyle/>
-          <a:p>
-            <a:pPr indent="0" fontAlgn="auto">
-              <a:spcAft>
-                <a:spcPts val="600"/>
-              </a:spcAft>
-              <a:buFont typeface="Arial" panose="020B0604020202020204" pitchFamily="34" charset="0"/>
-              <a:buNone/>
-            </a:pPr>
-            <a:r>
-              <a:rPr lang="en-US" altLang="zh-CN"/>
-              <a:t>Transformer</a:t>
-            </a:r>
-            <a:r>
-              <a:rPr lang="zh-CN" altLang="en-US"/>
-              <a:t>是一个有</a:t>
-            </a:r>
-            <a:r>
-              <a:rPr lang="en-US" altLang="zh-CN"/>
-              <a:t>Attention</a:t>
-            </a:r>
-            <a:r>
-              <a:rPr lang="zh-CN" altLang="en-US"/>
-              <a:t>机制的</a:t>
-            </a:r>
-            <a:r>
-              <a:rPr lang="en-US" altLang="zh-CN"/>
-              <a:t>encoder-decoder</a:t>
-            </a:r>
-            <a:r>
-              <a:rPr lang="zh-CN" altLang="en-US"/>
-              <a:t>结构。</a:t>
-            </a:r>
-            <a:endParaRPr lang="zh-CN" altLang="en-US"/>
-          </a:p>
-          <a:p>
-            <a:pPr indent="0" fontAlgn="auto">
-              <a:spcAft>
-                <a:spcPts val="600"/>
-              </a:spcAft>
-              <a:buFont typeface="Arial" panose="020B0604020202020204" pitchFamily="34" charset="0"/>
-              <a:buNone/>
-            </a:pPr>
-            <a:r>
-              <a:rPr lang="zh-CN" altLang="en-US"/>
-              <a:t>在</a:t>
-            </a:r>
-            <a:r>
-              <a:rPr lang="en-US" altLang="zh-CN"/>
-              <a:t>encoder</a:t>
-            </a:r>
-            <a:r>
-              <a:rPr lang="zh-CN" altLang="en-US"/>
-              <a:t>与</a:t>
-            </a:r>
-            <a:r>
-              <a:rPr lang="en-US" altLang="zh-CN"/>
-              <a:t>decoder</a:t>
-            </a:r>
-            <a:r>
-              <a:rPr lang="zh-CN" altLang="en-US"/>
-              <a:t>中使用</a:t>
-            </a:r>
-            <a:r>
-              <a:rPr lang="en-US" altLang="zh-CN"/>
-              <a:t>Positional Encoding, Multi-Head Attention</a:t>
-            </a:r>
-            <a:r>
-              <a:rPr lang="zh-CN" altLang="en-US"/>
-              <a:t>与全连接层</a:t>
-            </a:r>
-            <a:r>
-              <a:rPr lang="en-US" altLang="zh-CN"/>
-              <a:t>(FFN)</a:t>
-            </a:r>
-            <a:endParaRPr lang="en-US" altLang="zh-CN"/>
-          </a:p>
-        </p:txBody>
-      </p:sp>
-      <p:sp>
-        <p:nvSpPr>
-          <p:cNvPr id="6" name="文本框 5"/>
-          <p:cNvSpPr txBox="1"/>
-          <p:nvPr/>
-        </p:nvSpPr>
-        <p:spPr>
-          <a:xfrm>
-            <a:off x="8406130" y="1198880"/>
-            <a:ext cx="3054350" cy="1706880"/>
-          </a:xfrm>
-          <a:prstGeom prst="rect">
-            <a:avLst/>
-          </a:prstGeom>
-          <a:noFill/>
-        </p:spPr>
-        <p:txBody>
-          <a:bodyPr wrap="square" rtlCol="0">
-            <a:spAutoFit/>
-          </a:bodyPr>
-          <a:lstStyle/>
-          <a:p>
-            <a:pPr indent="0" fontAlgn="auto">
-              <a:spcAft>
-                <a:spcPts val="600"/>
-              </a:spcAft>
-              <a:buFont typeface="Arial" panose="020B0604020202020204" pitchFamily="34" charset="0"/>
-              <a:buNone/>
-            </a:pPr>
-            <a:r>
-              <a:rPr lang="en-US" altLang="zh-CN"/>
-              <a:t>MLM</a:t>
-            </a:r>
-            <a:r>
-              <a:rPr lang="zh-CN" altLang="en-US"/>
-              <a:t>：随机</a:t>
-            </a:r>
-            <a:r>
-              <a:rPr lang="en-US" altLang="zh-CN"/>
-              <a:t>Mask15%</a:t>
-            </a:r>
-            <a:r>
-              <a:rPr lang="zh-CN" altLang="en-US"/>
-              <a:t>的</a:t>
-            </a:r>
-            <a:r>
-              <a:rPr lang="en-US" altLang="zh-CN"/>
-              <a:t>token</a:t>
-            </a:r>
-            <a:r>
-              <a:rPr lang="zh-CN" altLang="en-US"/>
-              <a:t>。其中，</a:t>
-            </a:r>
-            <a:endParaRPr lang="zh-CN" altLang="en-US"/>
-          </a:p>
-          <a:p>
-            <a:pPr marL="285750" indent="-285750" fontAlgn="auto">
-              <a:spcAft>
-                <a:spcPts val="600"/>
-              </a:spcAft>
-              <a:buFont typeface="Arial" panose="020B0604020202020204" pitchFamily="34" charset="0"/>
-              <a:buChar char="•"/>
-            </a:pPr>
-            <a:r>
-              <a:rPr lang="en-US" altLang="zh-CN"/>
-              <a:t>80%</a:t>
-            </a:r>
-            <a:r>
-              <a:rPr lang="zh-CN" altLang="en-US"/>
-              <a:t>替换为</a:t>
-            </a:r>
-            <a:r>
-              <a:rPr lang="en-US" altLang="zh-CN"/>
-              <a:t>[Mask]</a:t>
-            </a:r>
-            <a:endParaRPr lang="en-US" altLang="zh-CN"/>
-          </a:p>
-          <a:p>
-            <a:pPr marL="285750" indent="-285750" fontAlgn="auto">
-              <a:spcAft>
-                <a:spcPts val="600"/>
-              </a:spcAft>
-              <a:buFont typeface="Arial" panose="020B0604020202020204" pitchFamily="34" charset="0"/>
-              <a:buChar char="•"/>
-            </a:pPr>
-            <a:r>
-              <a:rPr lang="en-US" altLang="zh-CN"/>
-              <a:t>10%</a:t>
-            </a:r>
-            <a:r>
-              <a:rPr lang="zh-CN" altLang="en-US"/>
-              <a:t>替换为其他任意单词</a:t>
-            </a:r>
-            <a:endParaRPr lang="zh-CN" altLang="en-US"/>
-          </a:p>
-          <a:p>
-            <a:pPr marL="285750" indent="-285750" fontAlgn="auto">
-              <a:spcAft>
-                <a:spcPts val="600"/>
-              </a:spcAft>
-              <a:buFont typeface="Arial" panose="020B0604020202020204" pitchFamily="34" charset="0"/>
-              <a:buChar char="•"/>
-            </a:pPr>
-            <a:r>
-              <a:rPr lang="en-US" altLang="zh-CN"/>
-              <a:t>10%</a:t>
-            </a:r>
-            <a:r>
-              <a:rPr lang="zh-CN" altLang="en-US"/>
-              <a:t>保留原始</a:t>
-            </a:r>
-            <a:r>
-              <a:rPr lang="en-US" altLang="zh-CN"/>
-              <a:t>token</a:t>
-            </a:r>
-            <a:endParaRPr lang="en-US" altLang="zh-CN"/>
-          </a:p>
-        </p:txBody>
-      </p:sp>
-      <p:sp>
-        <p:nvSpPr>
-          <p:cNvPr id="7" name="文本框 6"/>
-          <p:cNvSpPr txBox="1"/>
-          <p:nvPr/>
-        </p:nvSpPr>
-        <p:spPr>
-          <a:xfrm>
-            <a:off x="8406130" y="3725545"/>
-            <a:ext cx="3054350" cy="2461260"/>
-          </a:xfrm>
-          <a:prstGeom prst="rect">
-            <a:avLst/>
-          </a:prstGeom>
-          <a:noFill/>
-        </p:spPr>
-        <p:txBody>
-          <a:bodyPr wrap="square" rtlCol="0">
-            <a:spAutoFit/>
-          </a:bodyPr>
-          <a:lstStyle/>
-          <a:p>
-            <a:pPr indent="0" fontAlgn="auto">
-              <a:spcAft>
-                <a:spcPts val="600"/>
-              </a:spcAft>
-              <a:buFont typeface="Arial" panose="020B0604020202020204" pitchFamily="34" charset="0"/>
-              <a:buNone/>
-            </a:pPr>
-            <a:r>
-              <a:rPr lang="en-US"/>
-              <a:t>NSP</a:t>
-            </a:r>
-            <a:r>
-              <a:rPr lang="zh-CN" altLang="en-US"/>
-              <a:t>：对随机抽取连续的两句话进行</a:t>
-            </a:r>
-            <a:r>
-              <a:rPr lang="en-US" altLang="zh-CN"/>
-              <a:t>Mask</a:t>
-            </a:r>
-            <a:r>
-              <a:rPr lang="zh-CN" altLang="en-US"/>
-              <a:t>，其中，</a:t>
-            </a:r>
-            <a:endParaRPr lang="zh-CN" altLang="en-US"/>
-          </a:p>
-          <a:p>
-            <a:pPr marL="285750" indent="-285750" fontAlgn="auto">
-              <a:spcAft>
-                <a:spcPts val="600"/>
-              </a:spcAft>
-              <a:buFont typeface="Arial" panose="020B0604020202020204" pitchFamily="34" charset="0"/>
-              <a:buChar char="•"/>
-            </a:pPr>
-            <a:r>
-              <a:rPr lang="en-US" altLang="zh-CN"/>
-              <a:t>50%</a:t>
-            </a:r>
-            <a:r>
-              <a:rPr lang="zh-CN" altLang="en-US"/>
-              <a:t>进行保留，第二个句子和第一个句子之间为</a:t>
-            </a:r>
-            <a:r>
-              <a:rPr lang="en-US" altLang="zh-CN"/>
-              <a:t>IsNext</a:t>
-            </a:r>
-            <a:r>
-              <a:rPr lang="zh-CN" altLang="en-US"/>
-              <a:t>关系</a:t>
-            </a:r>
-            <a:endParaRPr lang="zh-CN" altLang="en-US"/>
-          </a:p>
-          <a:p>
-            <a:pPr marL="285750" indent="-285750" fontAlgn="auto">
-              <a:spcAft>
-                <a:spcPts val="600"/>
-              </a:spcAft>
-              <a:buFont typeface="Arial" panose="020B0604020202020204" pitchFamily="34" charset="0"/>
-              <a:buChar char="•"/>
-            </a:pPr>
-            <a:r>
-              <a:rPr lang="en-US" altLang="zh-CN"/>
-              <a:t>50%</a:t>
-            </a:r>
-            <a:r>
-              <a:rPr lang="zh-CN" altLang="en-US"/>
-              <a:t>将第二句话替换为任意一句话，与第一个句子之间为</a:t>
-            </a:r>
-            <a:r>
-              <a:rPr lang="en-US" altLang="zh-CN"/>
-              <a:t>NotNext</a:t>
-            </a:r>
-            <a:r>
-              <a:rPr lang="zh-CN" altLang="en-US"/>
-              <a:t>关系</a:t>
-            </a:r>
-            <a:endParaRPr lang="zh-CN" altLang="en-US"/>
-          </a:p>
-        </p:txBody>
-      </p:sp>
-    </p:spTree>
-  </p:cSld>
-  <p:clrMapOvr>
-    <a:masterClrMapping/>
-  </p:clrMapOvr>
-</p:sld>
-</file>
-
-<file path=ppt/slides/slide3.xml><?xml version="1.0" encoding="utf-8"?>
-<p:sld xmlns:a="http://schemas.openxmlformats.org/drawingml/2006/main" xmlns:r="http://schemas.openxmlformats.org/officeDocument/2006/relationships" xmlns:p="http://schemas.openxmlformats.org/presentationml/2006/main">
-  <p:cSld>
-    <p:spTree>
-      <p:nvGrpSpPr>
-        <p:cNvPr id="1" name=""/>
-        <p:cNvGrpSpPr/>
-        <p:nvPr/>
-      </p:nvGrpSpPr>
-      <p:grpSpPr>
-        <a:xfrm>
-          <a:off x="0" y="0"/>
-          <a:ext cx="0" cy="0"/>
-          <a:chOff x="0" y="0"/>
-          <a:chExt cx="0" cy="0"/>
-        </a:xfrm>
-      </p:grpSpPr>
-      <p:sp>
-        <p:nvSpPr>
-          <p:cNvPr id="2" name="标题 1"/>
-          <p:cNvSpPr>
-            <a:spLocks noGrp="1"/>
-          </p:cNvSpPr>
-          <p:nvPr>
-            <p:ph type="ctrTitle"/>
-          </p:nvPr>
-        </p:nvSpPr>
-        <p:spPr>
-          <a:xfrm>
-            <a:off x="389255" y="387350"/>
-            <a:ext cx="10852150" cy="811530"/>
-          </a:xfrm>
-        </p:spPr>
-        <p:txBody>
-          <a:bodyPr anchor="ctr" anchorCtr="0"/>
-          <a:lstStyle/>
-          <a:p>
-            <a:pPr algn="l"/>
-            <a:r>
-              <a:rPr lang="en-US" altLang="zh-CN" sz="3200">
-                <a:sym typeface="+mn-ea"/>
-              </a:rPr>
-              <a:t>B</a:t>
-            </a:r>
-            <a:r>
-              <a:rPr lang="en-US" sz="3200">
-                <a:sym typeface="+mn-ea"/>
-              </a:rPr>
-              <a:t>iLSTM(Bidirectional Long Short-Term Memory)</a:t>
-            </a:r>
-            <a:endParaRPr lang="en-US" sz="3200">
-              <a:sym typeface="+mn-ea"/>
-            </a:endParaRPr>
-          </a:p>
-        </p:txBody>
-      </p:sp>
-      <p:sp>
-        <p:nvSpPr>
-          <p:cNvPr id="4" name="文本框 3"/>
-          <p:cNvSpPr txBox="1"/>
-          <p:nvPr/>
-        </p:nvSpPr>
-        <p:spPr>
-          <a:xfrm>
-            <a:off x="808355" y="1485900"/>
-            <a:ext cx="4295775" cy="1198880"/>
-          </a:xfrm>
-          <a:prstGeom prst="rect">
-            <a:avLst/>
-          </a:prstGeom>
-          <a:noFill/>
-        </p:spPr>
-        <p:txBody>
-          <a:bodyPr wrap="square" rtlCol="0">
-            <a:spAutoFit/>
-          </a:bodyPr>
-          <a:lstStyle/>
-          <a:p>
-            <a:pPr indent="0" fontAlgn="auto">
-              <a:spcAft>
-                <a:spcPts val="600"/>
-              </a:spcAft>
-              <a:buFont typeface="Wingdings" panose="05000000000000000000" charset="0"/>
-              <a:buNone/>
-            </a:pPr>
-            <a:r>
-              <a:rPr lang="en-US" altLang="zh-CN"/>
-              <a:t>LSTM</a:t>
-            </a:r>
-            <a:r>
-              <a:rPr lang="zh-CN" altLang="en-US"/>
-              <a:t>将每个单元的</a:t>
-            </a:r>
-            <a:r>
-              <a:rPr lang="en-US" altLang="zh-CN"/>
-              <a:t>cell</a:t>
-            </a:r>
-            <a:r>
-              <a:rPr lang="zh-CN" altLang="en-US"/>
-              <a:t>状态</a:t>
-            </a:r>
-            <a:r>
-              <a:rPr lang="en-US" altLang="zh-CN"/>
-              <a:t>c</a:t>
-            </a:r>
-            <a:r>
-              <a:rPr lang="en-US" altLang="zh-CN" baseline="-25000"/>
-              <a:t>t-1</a:t>
-            </a:r>
-            <a:r>
-              <a:rPr lang="zh-CN" altLang="en-US"/>
-              <a:t>和</a:t>
-            </a:r>
-            <a:r>
-              <a:rPr lang="en-US" altLang="zh-CN"/>
-              <a:t>hidden</a:t>
-            </a:r>
-            <a:r>
-              <a:rPr lang="zh-CN" altLang="en-US"/>
-              <a:t>状态</a:t>
-            </a:r>
-            <a:r>
-              <a:rPr lang="en-US" altLang="zh-CN"/>
-              <a:t>h</a:t>
-            </a:r>
-            <a:r>
-              <a:rPr lang="en-US" altLang="zh-CN" baseline="-25000"/>
-              <a:t>t-1</a:t>
-            </a:r>
-            <a:r>
-              <a:rPr lang="zh-CN" altLang="en-US"/>
-              <a:t>，传递到下个单元，和下个单元的输入</a:t>
-            </a:r>
-            <a:r>
-              <a:rPr lang="en-US" altLang="zh-CN"/>
-              <a:t>x</a:t>
-            </a:r>
-            <a:r>
-              <a:rPr lang="en-US" altLang="zh-CN" baseline="-25000"/>
-              <a:t>t</a:t>
-            </a:r>
-            <a:r>
-              <a:rPr lang="zh-CN" altLang="en-US"/>
-              <a:t>一起更新下个单元的状态，并将输出继续向下传递。</a:t>
-            </a:r>
-            <a:endParaRPr lang="zh-CN" altLang="en-US"/>
-          </a:p>
-        </p:txBody>
-      </p:sp>
-      <p:pic>
-        <p:nvPicPr>
-          <p:cNvPr id="8" name="图片 7" descr="LSTM"/>
-          <p:cNvPicPr>
-            <a:picLocks noChangeAspect="1"/>
-          </p:cNvPicPr>
-          <p:nvPr/>
-        </p:nvPicPr>
-        <p:blipFill>
-          <a:blip r:embed="rId1"/>
-          <a:stretch>
-            <a:fillRect/>
-          </a:stretch>
-        </p:blipFill>
-        <p:spPr>
-          <a:xfrm>
-            <a:off x="6442075" y="1198880"/>
-            <a:ext cx="4716145" cy="1772920"/>
+            <a:off x="251809" y="1596893"/>
+            <a:ext cx="11688382" cy="3664214"/>
           </a:xfrm>
           <a:prstGeom prst="rect">
             <a:avLst/>
           </a:prstGeom>
         </p:spPr>
       </p:pic>
-      <p:pic>
-        <p:nvPicPr>
-          <p:cNvPr id="10" name="图片 9" descr="BiLSTM"/>
-          <p:cNvPicPr>
-            <a:picLocks noChangeAspect="1"/>
-          </p:cNvPicPr>
-          <p:nvPr/>
-        </p:nvPicPr>
-        <p:blipFill>
-          <a:blip r:embed="rId2"/>
-          <a:stretch>
-            <a:fillRect/>
-          </a:stretch>
-        </p:blipFill>
-        <p:spPr>
-          <a:xfrm>
-            <a:off x="808355" y="2972435"/>
-            <a:ext cx="6904990" cy="3848100"/>
-          </a:xfrm>
-          <a:prstGeom prst="rect">
-            <a:avLst/>
-          </a:prstGeom>
-        </p:spPr>
-      </p:pic>
-      <p:sp>
-        <p:nvSpPr>
-          <p:cNvPr id="11" name="文本框 10"/>
-          <p:cNvSpPr txBox="1"/>
-          <p:nvPr/>
-        </p:nvSpPr>
-        <p:spPr>
-          <a:xfrm>
-            <a:off x="7934325" y="4772025"/>
-            <a:ext cx="3307080" cy="645160"/>
-          </a:xfrm>
-          <a:prstGeom prst="rect">
-            <a:avLst/>
-          </a:prstGeom>
-          <a:noFill/>
-        </p:spPr>
-        <p:txBody>
-          <a:bodyPr wrap="square" rtlCol="0">
-            <a:spAutoFit/>
-          </a:bodyPr>
-          <a:lstStyle/>
-          <a:p>
-            <a:pPr indent="0" fontAlgn="auto">
-              <a:spcAft>
-                <a:spcPts val="600"/>
-              </a:spcAft>
-              <a:buFont typeface="Wingdings" panose="05000000000000000000" charset="0"/>
-              <a:buNone/>
-            </a:pPr>
-            <a:r>
-              <a:rPr lang="en-US" altLang="zh-CN">
-                <a:sym typeface="+mn-ea"/>
-              </a:rPr>
-              <a:t>BiLSTM</a:t>
-            </a:r>
-            <a:r>
-              <a:rPr lang="zh-CN" altLang="en-US">
-                <a:sym typeface="+mn-ea"/>
-              </a:rPr>
-              <a:t>由前向</a:t>
-            </a:r>
-            <a:r>
-              <a:rPr lang="en-US" altLang="zh-CN">
-                <a:sym typeface="+mn-ea"/>
-              </a:rPr>
-              <a:t>LSTM</a:t>
-            </a:r>
-            <a:r>
-              <a:rPr lang="zh-CN" altLang="en-US">
-                <a:sym typeface="+mn-ea"/>
-              </a:rPr>
-              <a:t>与后向</a:t>
-            </a:r>
-            <a:r>
-              <a:rPr lang="en-US" altLang="zh-CN">
-                <a:sym typeface="+mn-ea"/>
-              </a:rPr>
-              <a:t>LSTM</a:t>
-            </a:r>
-            <a:r>
-              <a:rPr lang="zh-CN" altLang="en-US">
-                <a:sym typeface="+mn-ea"/>
-              </a:rPr>
-              <a:t>组合而成，并将结果进行拼接。</a:t>
-            </a:r>
-            <a:endParaRPr lang="zh-CN" altLang="en-US"/>
-          </a:p>
-        </p:txBody>
-      </p:sp>
     </p:spTree>
-  </p:cSld>
-  <p:clrMapOvr>
-    <a:masterClrMapping/>
-  </p:clrMapOvr>
-</p:sld>
-</file>
-
-<file path=ppt/slides/slide4.xml><?xml version="1.0" encoding="utf-8"?>
-<p:sld xmlns:a="http://schemas.openxmlformats.org/drawingml/2006/main" xmlns:r="http://schemas.openxmlformats.org/officeDocument/2006/relationships" xmlns:p="http://schemas.openxmlformats.org/presentationml/2006/main">
-  <p:cSld>
-    <p:spTree>
-      <p:nvGrpSpPr>
-        <p:cNvPr id="1" name=""/>
-        <p:cNvGrpSpPr/>
-        <p:nvPr/>
-      </p:nvGrpSpPr>
-      <p:grpSpPr>
-        <a:xfrm>
-          <a:off x="0" y="0"/>
-          <a:ext cx="0" cy="0"/>
-          <a:chOff x="0" y="0"/>
-          <a:chExt cx="0" cy="0"/>
-        </a:xfrm>
-      </p:grpSpPr>
-      <p:sp>
-        <p:nvSpPr>
-          <p:cNvPr id="2" name="标题 1"/>
-          <p:cNvSpPr>
-            <a:spLocks noGrp="1"/>
-          </p:cNvSpPr>
-          <p:nvPr>
-            <p:ph type="ctrTitle"/>
-          </p:nvPr>
-        </p:nvSpPr>
-        <p:spPr>
-          <a:xfrm>
-            <a:off x="389255" y="387350"/>
-            <a:ext cx="10852150" cy="811530"/>
-          </a:xfrm>
-        </p:spPr>
-        <p:txBody>
-          <a:bodyPr anchor="ctr" anchorCtr="0">
-            <a:noAutofit/>
-          </a:bodyPr>
-          <a:lstStyle/>
-          <a:p>
-            <a:pPr algn="l"/>
-            <a:r>
-              <a:rPr lang="en-US" altLang="zh-CN" sz="3200" dirty="0" err="1">
-                <a:sym typeface="+mn-ea"/>
-              </a:rPr>
-              <a:t>CRF</a:t>
-            </a:r>
-            <a:r>
-              <a:rPr lang="en-US" altLang="zh-CN" sz="3200" dirty="0">
-                <a:sym typeface="+mn-ea"/>
-              </a:rPr>
-              <a:t>(Conditional Random Fields)</a:t>
-            </a:r>
-            <a:endParaRPr lang="en-US" altLang="zh-CN" sz="3200" dirty="0">
-              <a:sym typeface="+mn-ea"/>
-            </a:endParaRPr>
-          </a:p>
-        </p:txBody>
-      </p:sp>
-      <p:sp>
-        <p:nvSpPr>
-          <p:cNvPr id="4" name="文本框 3"/>
-          <p:cNvSpPr txBox="1"/>
-          <p:nvPr/>
-        </p:nvSpPr>
-        <p:spPr>
-          <a:xfrm>
-            <a:off x="562845" y="1579662"/>
-            <a:ext cx="6477147" cy="646331"/>
-          </a:xfrm>
-          <a:prstGeom prst="rect">
-            <a:avLst/>
-          </a:prstGeom>
-          <a:noFill/>
-        </p:spPr>
-        <p:txBody>
-          <a:bodyPr wrap="square" rtlCol="0">
-            <a:spAutoFit/>
-          </a:bodyPr>
-          <a:lstStyle/>
-          <a:p>
-            <a:pPr fontAlgn="auto">
-              <a:spcAft>
-                <a:spcPts val="600"/>
-              </a:spcAft>
-            </a:pPr>
-            <a:r>
-              <a:rPr lang="zh-CN" altLang="en-US" dirty="0"/>
-              <a:t>对每一个位置的词性的预测</a:t>
-            </a:r>
-            <a:r>
-              <a:rPr lang="en-US" altLang="zh-CN" dirty="0" err="1"/>
-              <a:t>y</a:t>
-            </a:r>
-            <a:r>
-              <a:rPr lang="en-US" altLang="zh-CN" baseline="-25000" dirty="0" err="1"/>
-              <a:t>t</a:t>
-            </a:r>
-            <a:r>
-              <a:rPr lang="zh-CN" altLang="en-US" dirty="0"/>
-              <a:t>，不仅受到当前输入（</a:t>
-            </a:r>
-            <a:r>
-              <a:rPr lang="en-US" altLang="zh-CN" dirty="0"/>
-              <a:t>token</a:t>
-            </a:r>
-            <a:r>
-              <a:rPr lang="zh-CN" altLang="en-US" dirty="0"/>
-              <a:t>）</a:t>
-            </a:r>
-            <a:r>
-              <a:rPr lang="en-US" altLang="zh-CN" dirty="0" err="1"/>
-              <a:t>x</a:t>
-            </a:r>
-            <a:r>
-              <a:rPr lang="en-US" altLang="zh-CN" baseline="-25000" dirty="0" err="1"/>
-              <a:t>t</a:t>
-            </a:r>
-            <a:r>
-              <a:rPr lang="zh-CN" altLang="en-US" dirty="0"/>
-              <a:t>的影响，还受到由前一个输入所预测的标签</a:t>
-            </a:r>
-            <a:r>
-              <a:rPr lang="en-US" altLang="zh-CN" dirty="0" err="1"/>
-              <a:t>y</a:t>
-            </a:r>
-            <a:r>
-              <a:rPr lang="en-US" altLang="zh-CN" baseline="-25000" dirty="0" err="1"/>
-              <a:t>t</a:t>
-            </a:r>
-            <a:r>
-              <a:rPr lang="en-US" altLang="zh-CN" baseline="-25000" dirty="0"/>
-              <a:t>-1</a:t>
-            </a:r>
-            <a:r>
-              <a:rPr lang="zh-CN" altLang="en-US" dirty="0"/>
-              <a:t>的影响。</a:t>
-            </a:r>
-            <a:endParaRPr lang="en-US" altLang="zh-CN" dirty="0"/>
-          </a:p>
-        </p:txBody>
-      </p:sp>
-      <p:sp>
-        <p:nvSpPr>
-          <p:cNvPr id="6" name="文本框 5"/>
-          <p:cNvSpPr txBox="1"/>
-          <p:nvPr/>
-        </p:nvSpPr>
-        <p:spPr>
-          <a:xfrm>
-            <a:off x="8039903" y="1801300"/>
-            <a:ext cx="3054350" cy="1477328"/>
-          </a:xfrm>
-          <a:prstGeom prst="rect">
-            <a:avLst/>
-          </a:prstGeom>
-          <a:noFill/>
-        </p:spPr>
-        <p:txBody>
-          <a:bodyPr wrap="square" rtlCol="0">
-            <a:spAutoFit/>
-          </a:bodyPr>
-          <a:lstStyle/>
-          <a:p>
-            <a:pPr fontAlgn="auto">
-              <a:spcAft>
-                <a:spcPts val="600"/>
-              </a:spcAft>
-            </a:pPr>
-            <a:r>
-              <a:rPr lang="zh-CN" altLang="en-US" dirty="0"/>
-              <a:t>使用基于动态规划的</a:t>
-            </a:r>
-            <a:r>
-              <a:rPr lang="en-US" altLang="zh-CN" dirty="0" err="1"/>
-              <a:t>Vertibi</a:t>
-            </a:r>
-            <a:r>
-              <a:rPr lang="zh-CN" altLang="en-US" dirty="0"/>
-              <a:t>算法</a:t>
-            </a:r>
-            <a:r>
-              <a:rPr lang="en-US" altLang="zh-CN" dirty="0"/>
-              <a:t>——</a:t>
-            </a:r>
-            <a:r>
-              <a:rPr lang="zh-CN" altLang="en-US" dirty="0"/>
-              <a:t>对于每个</a:t>
-            </a:r>
-            <a:r>
-              <a:rPr lang="en-US" altLang="zh-CN" dirty="0"/>
-              <a:t>token</a:t>
-            </a:r>
-            <a:r>
-              <a:rPr lang="zh-CN" altLang="en-US" dirty="0"/>
-              <a:t>磁性的预测，依次计算每个标签的得分，并选取概率最大者，用于后续词性的预测中。</a:t>
-            </a:r>
-            <a:endParaRPr lang="zh-CN" altLang="en-US" dirty="0"/>
-          </a:p>
-        </p:txBody>
-      </p:sp>
-      <p:pic>
-        <p:nvPicPr>
-          <p:cNvPr id="9" name="图片 8"/>
-          <p:cNvPicPr>
-            <a:picLocks noChangeAspect="1"/>
-          </p:cNvPicPr>
-          <p:nvPr/>
-        </p:nvPicPr>
-        <p:blipFill>
-          <a:blip r:embed="rId1"/>
-          <a:stretch>
-            <a:fillRect/>
-          </a:stretch>
-        </p:blipFill>
-        <p:spPr>
-          <a:xfrm>
-            <a:off x="898124" y="2857283"/>
-            <a:ext cx="6048375" cy="2028825"/>
-          </a:xfrm>
-          <a:prstGeom prst="rect">
-            <a:avLst/>
-          </a:prstGeom>
-        </p:spPr>
-      </p:pic>
-      <p:grpSp>
-        <p:nvGrpSpPr>
-          <p:cNvPr id="14" name="组合 13"/>
-          <p:cNvGrpSpPr/>
-          <p:nvPr/>
-        </p:nvGrpSpPr>
-        <p:grpSpPr>
-          <a:xfrm>
-            <a:off x="7723388" y="3707693"/>
-            <a:ext cx="4095750" cy="1529477"/>
-            <a:chOff x="1100738" y="3987656"/>
-            <a:chExt cx="4095750" cy="1529477"/>
-          </a:xfrm>
-        </p:grpSpPr>
-        <p:pic>
-          <p:nvPicPr>
-            <p:cNvPr id="11" name="图片 10"/>
-            <p:cNvPicPr>
-              <a:picLocks noChangeAspect="1"/>
-            </p:cNvPicPr>
-            <p:nvPr/>
-          </p:nvPicPr>
-          <p:blipFill>
-            <a:blip r:embed="rId2"/>
-            <a:stretch>
-              <a:fillRect/>
-            </a:stretch>
-          </p:blipFill>
-          <p:spPr>
-            <a:xfrm>
-              <a:off x="1100738" y="3987656"/>
-              <a:ext cx="4095750" cy="847725"/>
-            </a:xfrm>
-            <a:prstGeom prst="rect">
-              <a:avLst/>
-            </a:prstGeom>
-          </p:spPr>
-        </p:pic>
-        <p:pic>
-          <p:nvPicPr>
-            <p:cNvPr id="13" name="图片 12"/>
-            <p:cNvPicPr>
-              <a:picLocks noChangeAspect="1"/>
-            </p:cNvPicPr>
-            <p:nvPr/>
-          </p:nvPicPr>
-          <p:blipFill>
-            <a:blip r:embed="rId3"/>
-            <a:stretch>
-              <a:fillRect/>
-            </a:stretch>
-          </p:blipFill>
-          <p:spPr>
-            <a:xfrm>
-              <a:off x="1196822" y="4697983"/>
-              <a:ext cx="3619500" cy="819150"/>
-            </a:xfrm>
-            <a:prstGeom prst="rect">
-              <a:avLst/>
-            </a:prstGeom>
-          </p:spPr>
-        </p:pic>
-      </p:grpSp>
-    </p:spTree>
-  </p:cSld>
-  <p:clrMapOvr>
-    <a:masterClrMapping/>
-  </p:clrMapOvr>
-</p:sld>
-</file>
-
-<file path=ppt/slides/slide5.xml><?xml version="1.0" encoding="utf-8"?>
-<p:sld xmlns:a="http://schemas.openxmlformats.org/drawingml/2006/main" xmlns:r="http://schemas.openxmlformats.org/officeDocument/2006/relationships" xmlns:p="http://schemas.openxmlformats.org/presentationml/2006/main">
-  <p:cSld>
-    <p:spTree>
-      <p:nvGrpSpPr>
-        <p:cNvPr id="1" name=""/>
-        <p:cNvGrpSpPr/>
-        <p:nvPr/>
-      </p:nvGrpSpPr>
-      <p:grpSpPr>
-        <a:xfrm>
-          <a:off x="0" y="0"/>
-          <a:ext cx="0" cy="0"/>
-          <a:chOff x="0" y="0"/>
-          <a:chExt cx="0" cy="0"/>
-        </a:xfrm>
-      </p:grpSpPr>
-      <p:sp>
-        <p:nvSpPr>
-          <p:cNvPr id="2" name="标题 1"/>
-          <p:cNvSpPr>
-            <a:spLocks noGrp="1"/>
-          </p:cNvSpPr>
-          <p:nvPr>
-            <p:ph type="ctrTitle"/>
-          </p:nvPr>
-        </p:nvSpPr>
-        <p:spPr>
-          <a:xfrm>
-            <a:off x="389255" y="387350"/>
-            <a:ext cx="3719830" cy="811530"/>
-          </a:xfrm>
-        </p:spPr>
-        <p:txBody>
-          <a:bodyPr anchor="ctr" anchorCtr="0"/>
-          <a:lstStyle/>
-          <a:p>
-            <a:pPr algn="l"/>
-            <a:r>
-              <a:rPr lang="en-US" altLang="zh-CN" sz="3600"/>
-              <a:t>Reference</a:t>
-            </a:r>
-            <a:endParaRPr lang="en-US" altLang="zh-CN" sz="3600"/>
-          </a:p>
-        </p:txBody>
-      </p:sp>
-      <p:sp>
-        <p:nvSpPr>
-          <p:cNvPr id="30" name="文本框 29"/>
-          <p:cNvSpPr txBox="1"/>
-          <p:nvPr/>
-        </p:nvSpPr>
-        <p:spPr>
-          <a:xfrm>
-            <a:off x="1122045" y="1487170"/>
-            <a:ext cx="10010775" cy="1785104"/>
-          </a:xfrm>
-          <a:prstGeom prst="rect">
-            <a:avLst/>
-          </a:prstGeom>
-          <a:noFill/>
-        </p:spPr>
-        <p:txBody>
-          <a:bodyPr wrap="square" rtlCol="0">
-            <a:spAutoFit/>
-          </a:bodyPr>
-          <a:lstStyle/>
-          <a:p>
-            <a:pPr marL="285750" indent="-285750" fontAlgn="auto">
-              <a:spcAft>
-                <a:spcPts val="600"/>
-              </a:spcAft>
-              <a:buFont typeface="Wingdings" panose="05000000000000000000" charset="0"/>
-              <a:buChar char="l"/>
-            </a:pPr>
-            <a:r>
-              <a:rPr lang="en-US" altLang="zh-CN" dirty="0"/>
-              <a:t>Attention is All You Need</a:t>
-            </a:r>
-            <a:endParaRPr lang="en-US" altLang="zh-CN" dirty="0"/>
-          </a:p>
-          <a:p>
-            <a:pPr marL="285750" indent="-285750" fontAlgn="auto">
-              <a:spcAft>
-                <a:spcPts val="600"/>
-              </a:spcAft>
-              <a:buFont typeface="Wingdings" panose="05000000000000000000" charset="0"/>
-              <a:buChar char="l"/>
-            </a:pPr>
-            <a:r>
-              <a:rPr lang="en-US" altLang="zh-CN" dirty="0"/>
-              <a:t>BERT: Pre-training of Deep Bidirectional Transformers for Language Understanding</a:t>
-            </a:r>
-            <a:endParaRPr lang="zh-CN" dirty="0"/>
-          </a:p>
-          <a:p>
-            <a:pPr marL="285750" indent="-285750" fontAlgn="auto">
-              <a:spcAft>
-                <a:spcPts val="600"/>
-              </a:spcAft>
-              <a:buFont typeface="Wingdings" panose="05000000000000000000" charset="0"/>
-              <a:buChar char="l"/>
-            </a:pPr>
-            <a:r>
-              <a:rPr lang="en-US" altLang="zh-CN" dirty="0" err="1"/>
-              <a:t>BiLSTM</a:t>
-            </a:r>
-            <a:r>
-              <a:rPr lang="zh-CN" altLang="en-US" dirty="0"/>
-              <a:t>介绍及代码实现 </a:t>
-            </a:r>
-            <a:r>
-              <a:rPr lang="zh-CN" altLang="en-US" dirty="0">
-                <a:hlinkClick r:id="rId1"/>
-              </a:rPr>
-              <a:t>https://www.jiqizhixin.com/articles/2018-10-24-13</a:t>
-            </a:r>
-            <a:endParaRPr lang="en-US" altLang="zh-CN" dirty="0"/>
-          </a:p>
-          <a:p>
-            <a:pPr marL="285750" indent="-285750" fontAlgn="auto">
-              <a:spcAft>
-                <a:spcPts val="600"/>
-              </a:spcAft>
-              <a:buFont typeface="Wingdings" panose="05000000000000000000" charset="0"/>
-              <a:buChar char="l"/>
-            </a:pPr>
-            <a:r>
-              <a:rPr lang="en-US" altLang="zh-CN" dirty="0"/>
-              <a:t>An Introduction to Conditional Random Fields</a:t>
-            </a:r>
-            <a:endParaRPr lang="zh-CN" altLang="en-US" dirty="0"/>
-          </a:p>
-          <a:p>
-            <a:pPr marL="285750" indent="-285750" fontAlgn="auto">
-              <a:spcAft>
-                <a:spcPts val="600"/>
-              </a:spcAft>
-              <a:buFont typeface="Wingdings" panose="05000000000000000000" charset="0"/>
-              <a:buChar char="l"/>
-            </a:pPr>
-            <a:r>
-              <a:rPr lang="en-US" altLang="zh-CN" dirty="0"/>
-              <a:t>Classical Probabilistic Models and Conditional Random Fields</a:t>
-            </a:r>
-            <a:endParaRPr lang="zh-CN" altLang="en-US" dirty="0"/>
-          </a:p>
-        </p:txBody>
-      </p:sp>
-    </p:spTree>
+    <p:extLst>
+      <p:ext uri="{BB962C8B-B14F-4D97-AF65-F5344CB8AC3E}">
+        <p14:creationId xmlns:p14="http://schemas.microsoft.com/office/powerpoint/2010/main" val="3120098017"/>
+      </p:ext>
+    </p:extLst>
   </p:cSld>
   <p:clrMapOvr>
     <a:masterClrMapping/>
@@ -5146,6 +3547,8 @@
       </a:bgFillStyleLst>
     </a:fmtScheme>
   </a:themeElements>
+  <a:objectDefaults/>
+  <a:extraClrSchemeLst/>
   <a:extLst>
     <a:ext uri="{05A4C25C-085E-4340-85A3-A5531E510DB2}">
       <thm15:themeFamily xmlns:thm15="http://schemas.microsoft.com/office/thememl/2012/main" name="Office Theme" id="{62F939B6-93AF-4DB8-9C6B-D6C7DFDC589F}" vid="{4A3C46E8-61CC-4603-A589-7422A47A8E4A}"/>

</xml_diff>